<commit_message>
Updated Table for Travis CI
</commit_message>
<xml_diff>
--- a/CI_TEAMC.pptx
+++ b/CI_TEAMC.pptx
@@ -1086,7 +1086,23 @@
         <a:p>
           <a:r>
             <a:rPr lang="pt-PT" sz="700" dirty="0" smtClean="0"/>
-            <a:t>Too simplistic apresentation</a:t>
+            <a:t>Too </a:t>
+          </a:r>
+          <a:r>
+            <a:rPr lang="pt-PT" sz="700" dirty="0" err="1" smtClean="0"/>
+            <a:t>simplistic</a:t>
+          </a:r>
+          <a:r>
+            <a:rPr lang="pt-PT" sz="700" dirty="0" smtClean="0"/>
+            <a:t> </a:t>
+          </a:r>
+          <a:r>
+            <a:rPr lang="pt-PT" sz="700" dirty="0" smtClean="0"/>
+            <a:t>a </a:t>
+          </a:r>
+          <a:r>
+            <a:rPr lang="pt-PT" sz="700" dirty="0" err="1" smtClean="0"/>
+            <a:t>presentation</a:t>
           </a:r>
           <a:endParaRPr lang="pt-PT" sz="700" dirty="0"/>
         </a:p>
@@ -1382,7 +1398,23 @@
         <a:p>
           <a:r>
             <a:rPr lang="pt-PT" sz="700" dirty="0" smtClean="0"/>
-            <a:t>Possibility to do “nightly builds” – good to big projects</a:t>
+            <a:t>Possibility to do “nightly builds” – </a:t>
+          </a:r>
+          <a:r>
+            <a:rPr lang="pt-PT" sz="700" dirty="0" err="1" smtClean="0"/>
+            <a:t>good</a:t>
+          </a:r>
+          <a:r>
+            <a:rPr lang="pt-PT" sz="700" dirty="0" smtClean="0"/>
+            <a:t> </a:t>
+          </a:r>
+          <a:r>
+            <a:rPr lang="pt-PT" sz="700" dirty="0" smtClean="0"/>
+            <a:t>for </a:t>
+          </a:r>
+          <a:r>
+            <a:rPr lang="pt-PT" sz="700" dirty="0" smtClean="0"/>
+            <a:t>big projects</a:t>
           </a:r>
           <a:endParaRPr lang="pt-PT" sz="700" dirty="0"/>
         </a:p>
@@ -1499,6 +1531,13 @@
         </dgm:presLayoutVars>
       </dgm:prSet>
       <dgm:spPr/>
+      <dgm:t>
+        <a:bodyPr/>
+        <a:lstStyle/>
+        <a:p>
+          <a:endParaRPr lang="pt-PT"/>
+        </a:p>
+      </dgm:t>
     </dgm:pt>
     <dgm:pt modelId="{95A8F5A5-B508-4717-9764-313C12304A7F}" type="pres">
       <dgm:prSet presAssocID="{D23EB86A-71BB-4A40-A569-8B77FDBE02FA}" presName="root" presStyleCnt="0"/>
@@ -1522,6 +1561,13 @@
     <dgm:pt modelId="{A75A51E0-87EF-40A0-961A-12248580B45C}" type="pres">
       <dgm:prSet presAssocID="{D23EB86A-71BB-4A40-A569-8B77FDBE02FA}" presName="rootConnector" presStyleLbl="node1" presStyleIdx="0" presStyleCnt="2"/>
       <dgm:spPr/>
+      <dgm:t>
+        <a:bodyPr/>
+        <a:lstStyle/>
+        <a:p>
+          <a:endParaRPr lang="pt-PT"/>
+        </a:p>
+      </dgm:t>
     </dgm:pt>
     <dgm:pt modelId="{1B77CE49-E1AC-4350-AE31-A44BBBD23FA4}" type="pres">
       <dgm:prSet presAssocID="{D23EB86A-71BB-4A40-A569-8B77FDBE02FA}" presName="childShape" presStyleCnt="0"/>
@@ -1530,6 +1576,13 @@
     <dgm:pt modelId="{36E41940-D6AE-4B61-9614-578943ADDEBE}" type="pres">
       <dgm:prSet presAssocID="{1D5B013C-3814-4DBA-A114-793515C3A175}" presName="Name13" presStyleLbl="parChTrans1D2" presStyleIdx="0" presStyleCnt="13"/>
       <dgm:spPr/>
+      <dgm:t>
+        <a:bodyPr/>
+        <a:lstStyle/>
+        <a:p>
+          <a:endParaRPr lang="pt-PT"/>
+        </a:p>
+      </dgm:t>
     </dgm:pt>
     <dgm:pt modelId="{62B5FB75-42A9-43BC-8FD2-7AB5067B12F7}" type="pres">
       <dgm:prSet presAssocID="{E37FFE57-7D3E-4712-B6FD-24123D60E026}" presName="childText" presStyleLbl="bgAcc1" presStyleIdx="0" presStyleCnt="13" custScaleX="121000" custScaleY="121000">
@@ -1538,10 +1591,24 @@
         </dgm:presLayoutVars>
       </dgm:prSet>
       <dgm:spPr/>
+      <dgm:t>
+        <a:bodyPr/>
+        <a:lstStyle/>
+        <a:p>
+          <a:endParaRPr lang="pt-PT"/>
+        </a:p>
+      </dgm:t>
     </dgm:pt>
     <dgm:pt modelId="{E91EC1B8-A184-48D1-9A69-E934B5C7B28A}" type="pres">
       <dgm:prSet presAssocID="{3839A656-D98B-47E9-A658-DF73304CEB18}" presName="Name13" presStyleLbl="parChTrans1D2" presStyleIdx="1" presStyleCnt="13"/>
       <dgm:spPr/>
+      <dgm:t>
+        <a:bodyPr/>
+        <a:lstStyle/>
+        <a:p>
+          <a:endParaRPr lang="pt-PT"/>
+        </a:p>
+      </dgm:t>
     </dgm:pt>
     <dgm:pt modelId="{4BFBAF82-2A9D-4DC1-A988-0880718FA259}" type="pres">
       <dgm:prSet presAssocID="{C1E12F4A-6EB8-4EF1-9A2E-60BEBFA81592}" presName="childText" presStyleLbl="bgAcc1" presStyleIdx="1" presStyleCnt="13" custScaleX="121000" custScaleY="121000">
@@ -1550,10 +1617,24 @@
         </dgm:presLayoutVars>
       </dgm:prSet>
       <dgm:spPr/>
+      <dgm:t>
+        <a:bodyPr/>
+        <a:lstStyle/>
+        <a:p>
+          <a:endParaRPr lang="pt-PT"/>
+        </a:p>
+      </dgm:t>
     </dgm:pt>
     <dgm:pt modelId="{6CF04F40-20BC-4EE2-A8E0-91CE9C5F4FA8}" type="pres">
       <dgm:prSet presAssocID="{37769943-29F6-4B68-A449-5DEE7577C941}" presName="Name13" presStyleLbl="parChTrans1D2" presStyleIdx="2" presStyleCnt="13"/>
       <dgm:spPr/>
+      <dgm:t>
+        <a:bodyPr/>
+        <a:lstStyle/>
+        <a:p>
+          <a:endParaRPr lang="pt-PT"/>
+        </a:p>
+      </dgm:t>
     </dgm:pt>
     <dgm:pt modelId="{7E81931F-3C81-4DB3-82D5-109D76282892}" type="pres">
       <dgm:prSet presAssocID="{EE83A711-B233-4784-8790-B3D0B5AA4273}" presName="childText" presStyleLbl="bgAcc1" presStyleIdx="2" presStyleCnt="13" custScaleX="121000" custScaleY="121000">
@@ -1562,10 +1643,24 @@
         </dgm:presLayoutVars>
       </dgm:prSet>
       <dgm:spPr/>
+      <dgm:t>
+        <a:bodyPr/>
+        <a:lstStyle/>
+        <a:p>
+          <a:endParaRPr lang="pt-PT"/>
+        </a:p>
+      </dgm:t>
     </dgm:pt>
     <dgm:pt modelId="{59F0254C-AFAD-4E3D-A8F7-6171D1D72BE5}" type="pres">
       <dgm:prSet presAssocID="{DA8DF7CA-1898-479A-AB8B-30F622A20386}" presName="Name13" presStyleLbl="parChTrans1D2" presStyleIdx="3" presStyleCnt="13"/>
       <dgm:spPr/>
+      <dgm:t>
+        <a:bodyPr/>
+        <a:lstStyle/>
+        <a:p>
+          <a:endParaRPr lang="pt-PT"/>
+        </a:p>
+      </dgm:t>
     </dgm:pt>
     <dgm:pt modelId="{8C1715B6-BA7B-438E-97EB-8AEC5ECBF87A}" type="pres">
       <dgm:prSet presAssocID="{D29747DE-81BE-44CC-ADFA-D349E8B24264}" presName="childText" presStyleLbl="bgAcc1" presStyleIdx="3" presStyleCnt="13" custScaleX="121000" custScaleY="121000">
@@ -1574,10 +1669,24 @@
         </dgm:presLayoutVars>
       </dgm:prSet>
       <dgm:spPr/>
+      <dgm:t>
+        <a:bodyPr/>
+        <a:lstStyle/>
+        <a:p>
+          <a:endParaRPr lang="pt-PT"/>
+        </a:p>
+      </dgm:t>
     </dgm:pt>
     <dgm:pt modelId="{B128F964-9EE8-46FF-B519-C8284E2BB040}" type="pres">
       <dgm:prSet presAssocID="{3F425AB1-C509-4C12-835D-8FB48463C56E}" presName="Name13" presStyleLbl="parChTrans1D2" presStyleIdx="4" presStyleCnt="13"/>
       <dgm:spPr/>
+      <dgm:t>
+        <a:bodyPr/>
+        <a:lstStyle/>
+        <a:p>
+          <a:endParaRPr lang="pt-PT"/>
+        </a:p>
+      </dgm:t>
     </dgm:pt>
     <dgm:pt modelId="{3548ED33-673B-47FB-8DF9-F219CFA710BC}" type="pres">
       <dgm:prSet presAssocID="{2B7155C7-BEBA-47E6-A611-578103620110}" presName="childText" presStyleLbl="bgAcc1" presStyleIdx="4" presStyleCnt="13" custScaleX="121000" custScaleY="121000">
@@ -1597,6 +1706,13 @@
     <dgm:pt modelId="{4A64C365-06C2-46B7-B947-59EF5BE39B6D}" type="pres">
       <dgm:prSet presAssocID="{27188142-555D-4CE0-8FCC-5EF4E1AE4524}" presName="Name13" presStyleLbl="parChTrans1D2" presStyleIdx="5" presStyleCnt="13"/>
       <dgm:spPr/>
+      <dgm:t>
+        <a:bodyPr/>
+        <a:lstStyle/>
+        <a:p>
+          <a:endParaRPr lang="pt-PT"/>
+        </a:p>
+      </dgm:t>
     </dgm:pt>
     <dgm:pt modelId="{831964B1-E01A-4C78-9158-C8D63428B7DA}" type="pres">
       <dgm:prSet presAssocID="{548E3DBA-F067-4E78-8538-35AFB2F1818B}" presName="childText" presStyleLbl="bgAcc1" presStyleIdx="5" presStyleCnt="13" custScaleX="121000" custScaleY="121000">
@@ -1616,6 +1732,13 @@
     <dgm:pt modelId="{CC93376A-112F-470C-A92E-6B9C4768A381}" type="pres">
       <dgm:prSet presAssocID="{D28794C1-D31F-40DE-AE24-412233A7CACB}" presName="Name13" presStyleLbl="parChTrans1D2" presStyleIdx="6" presStyleCnt="13"/>
       <dgm:spPr/>
+      <dgm:t>
+        <a:bodyPr/>
+        <a:lstStyle/>
+        <a:p>
+          <a:endParaRPr lang="pt-PT"/>
+        </a:p>
+      </dgm:t>
     </dgm:pt>
     <dgm:pt modelId="{A5E6D460-1049-4DD1-B5F1-BB5A03E46C6F}" type="pres">
       <dgm:prSet presAssocID="{52572F2B-AAE6-4BE9-9BBD-CB4C6B7CD675}" presName="childText" presStyleLbl="bgAcc1" presStyleIdx="6" presStyleCnt="13" custScaleX="121000" custScaleY="121000">
@@ -1624,6 +1747,13 @@
         </dgm:presLayoutVars>
       </dgm:prSet>
       <dgm:spPr/>
+      <dgm:t>
+        <a:bodyPr/>
+        <a:lstStyle/>
+        <a:p>
+          <a:endParaRPr lang="pt-PT"/>
+        </a:p>
+      </dgm:t>
     </dgm:pt>
     <dgm:pt modelId="{F9B07FBF-7938-4CD1-92ED-F072654300E9}" type="pres">
       <dgm:prSet presAssocID="{B66C6E76-A77D-4BAE-A190-E7C7B99630D5}" presName="root" presStyleCnt="0"/>
@@ -1636,10 +1766,24 @@
     <dgm:pt modelId="{2D6695BE-25C1-46C7-8352-964F3DB123E4}" type="pres">
       <dgm:prSet presAssocID="{B66C6E76-A77D-4BAE-A190-E7C7B99630D5}" presName="rootText" presStyleLbl="node1" presStyleIdx="1" presStyleCnt="2" custScaleX="133100" custScaleY="133100"/>
       <dgm:spPr/>
+      <dgm:t>
+        <a:bodyPr/>
+        <a:lstStyle/>
+        <a:p>
+          <a:endParaRPr lang="pt-PT"/>
+        </a:p>
+      </dgm:t>
     </dgm:pt>
     <dgm:pt modelId="{06CA16BD-3E66-4C53-92B0-52C52AD63648}" type="pres">
       <dgm:prSet presAssocID="{B66C6E76-A77D-4BAE-A190-E7C7B99630D5}" presName="rootConnector" presStyleLbl="node1" presStyleIdx="1" presStyleCnt="2"/>
       <dgm:spPr/>
+      <dgm:t>
+        <a:bodyPr/>
+        <a:lstStyle/>
+        <a:p>
+          <a:endParaRPr lang="pt-PT"/>
+        </a:p>
+      </dgm:t>
     </dgm:pt>
     <dgm:pt modelId="{9B28A051-41E6-4E39-9511-B5D88A12ABAA}" type="pres">
       <dgm:prSet presAssocID="{B66C6E76-A77D-4BAE-A190-E7C7B99630D5}" presName="childShape" presStyleCnt="0"/>
@@ -1648,6 +1792,13 @@
     <dgm:pt modelId="{665B2015-8348-4619-A88A-458FE46C5216}" type="pres">
       <dgm:prSet presAssocID="{7B27C1B8-5A68-42C8-A979-98E005722E76}" presName="Name13" presStyleLbl="parChTrans1D2" presStyleIdx="7" presStyleCnt="13"/>
       <dgm:spPr/>
+      <dgm:t>
+        <a:bodyPr/>
+        <a:lstStyle/>
+        <a:p>
+          <a:endParaRPr lang="pt-PT"/>
+        </a:p>
+      </dgm:t>
     </dgm:pt>
     <dgm:pt modelId="{6817C1B7-11FB-4758-B864-210D01678FDC}" type="pres">
       <dgm:prSet presAssocID="{49F53E7A-EFE3-49C9-BF91-10D4091DFF4B}" presName="childText" presStyleLbl="bgAcc1" presStyleIdx="7" presStyleCnt="13" custScaleX="121000" custScaleY="121000">
@@ -1667,6 +1818,13 @@
     <dgm:pt modelId="{0B3358E2-26D5-461E-AD31-7A4654034337}" type="pres">
       <dgm:prSet presAssocID="{8BD967C0-A55D-48F9-95B1-733E8F50B17C}" presName="Name13" presStyleLbl="parChTrans1D2" presStyleIdx="8" presStyleCnt="13"/>
       <dgm:spPr/>
+      <dgm:t>
+        <a:bodyPr/>
+        <a:lstStyle/>
+        <a:p>
+          <a:endParaRPr lang="pt-PT"/>
+        </a:p>
+      </dgm:t>
     </dgm:pt>
     <dgm:pt modelId="{0E7FBF3B-7D1F-4A68-8FFB-C953C781DE15}" type="pres">
       <dgm:prSet presAssocID="{26EAFC01-7D93-44D6-B927-7C773411E24C}" presName="childText" presStyleLbl="bgAcc1" presStyleIdx="8" presStyleCnt="13" custScaleX="121000" custScaleY="121000">
@@ -1686,6 +1844,13 @@
     <dgm:pt modelId="{2F157E92-6736-4A13-A6CB-BE96A53AFD9F}" type="pres">
       <dgm:prSet presAssocID="{E37E2F2F-CD39-482B-9878-0ED5657CF008}" presName="Name13" presStyleLbl="parChTrans1D2" presStyleIdx="9" presStyleCnt="13"/>
       <dgm:spPr/>
+      <dgm:t>
+        <a:bodyPr/>
+        <a:lstStyle/>
+        <a:p>
+          <a:endParaRPr lang="pt-PT"/>
+        </a:p>
+      </dgm:t>
     </dgm:pt>
     <dgm:pt modelId="{548B7762-B5B8-4C69-88AE-F72473B32CBC}" type="pres">
       <dgm:prSet presAssocID="{6D187876-D73A-4DA0-8A96-0B77CF7C51D8}" presName="childText" presStyleLbl="bgAcc1" presStyleIdx="9" presStyleCnt="13" custScaleX="121000" custScaleY="121000">
@@ -1705,6 +1870,13 @@
     <dgm:pt modelId="{D69BB881-E2F5-44B9-9DBD-6D90C7DB7496}" type="pres">
       <dgm:prSet presAssocID="{391C7100-F7CB-404F-9784-D4A0A18ED1F2}" presName="Name13" presStyleLbl="parChTrans1D2" presStyleIdx="10" presStyleCnt="13"/>
       <dgm:spPr/>
+      <dgm:t>
+        <a:bodyPr/>
+        <a:lstStyle/>
+        <a:p>
+          <a:endParaRPr lang="pt-PT"/>
+        </a:p>
+      </dgm:t>
     </dgm:pt>
     <dgm:pt modelId="{50E43E93-9EF6-4576-8695-D64977549991}" type="pres">
       <dgm:prSet presAssocID="{95D8C2BB-FFF3-4F61-8445-6BF1251A0DDC}" presName="childText" presStyleLbl="bgAcc1" presStyleIdx="10" presStyleCnt="13" custScaleX="121000" custScaleY="121000">
@@ -1724,6 +1896,13 @@
     <dgm:pt modelId="{4F01DEA1-6963-411C-B81A-F6998C0C045E}" type="pres">
       <dgm:prSet presAssocID="{1317B38D-2A30-4107-9F27-1500BCF7FC6F}" presName="Name13" presStyleLbl="parChTrans1D2" presStyleIdx="11" presStyleCnt="13"/>
       <dgm:spPr/>
+      <dgm:t>
+        <a:bodyPr/>
+        <a:lstStyle/>
+        <a:p>
+          <a:endParaRPr lang="pt-PT"/>
+        </a:p>
+      </dgm:t>
     </dgm:pt>
     <dgm:pt modelId="{5F110DA3-1DE8-4F12-A68F-86C4A5BF1E8C}" type="pres">
       <dgm:prSet presAssocID="{E4BAB214-F282-46A9-895A-D9BD0E84DB3F}" presName="childText" presStyleLbl="bgAcc1" presStyleIdx="11" presStyleCnt="13" custScaleX="121000" custScaleY="121000">
@@ -1743,6 +1922,13 @@
     <dgm:pt modelId="{42A4DB9D-6604-49D8-A581-EB7995E16BE9}" type="pres">
       <dgm:prSet presAssocID="{6D2CB1FD-153F-413A-9094-97A8C82D1A59}" presName="Name13" presStyleLbl="parChTrans1D2" presStyleIdx="12" presStyleCnt="13"/>
       <dgm:spPr/>
+      <dgm:t>
+        <a:bodyPr/>
+        <a:lstStyle/>
+        <a:p>
+          <a:endParaRPr lang="pt-PT"/>
+        </a:p>
+      </dgm:t>
     </dgm:pt>
     <dgm:pt modelId="{7FB5A010-9A56-4829-B858-D0D824AEF6AD}" type="pres">
       <dgm:prSet presAssocID="{EFA38823-71A3-47C6-B0F4-1CB6C01186B4}" presName="childText" presStyleLbl="bgAcc1" presStyleIdx="12" presStyleCnt="13" custScaleX="121000" custScaleY="121000">
@@ -1751,55 +1937,62 @@
         </dgm:presLayoutVars>
       </dgm:prSet>
       <dgm:spPr/>
+      <dgm:t>
+        <a:bodyPr/>
+        <a:lstStyle/>
+        <a:p>
+          <a:endParaRPr lang="pt-PT"/>
+        </a:p>
+      </dgm:t>
     </dgm:pt>
   </dgm:ptLst>
   <dgm:cxnLst>
+    <dgm:cxn modelId="{950CD349-9C7F-4583-8ED7-AE6EB571A6CD}" type="presOf" srcId="{DA8DF7CA-1898-479A-AB8B-30F622A20386}" destId="{59F0254C-AFAD-4E3D-A8F7-6171D1D72BE5}" srcOrd="0" destOrd="0" presId="urn:microsoft.com/office/officeart/2005/8/layout/hierarchy3"/>
+    <dgm:cxn modelId="{A2F9B0F4-AA78-4158-8B2E-635DF7ACED91}" type="presOf" srcId="{6D2CB1FD-153F-413A-9094-97A8C82D1A59}" destId="{42A4DB9D-6604-49D8-A581-EB7995E16BE9}" srcOrd="0" destOrd="0" presId="urn:microsoft.com/office/officeart/2005/8/layout/hierarchy3"/>
+    <dgm:cxn modelId="{A72944CA-EA98-4912-BD8E-D7A0B9B4AAED}" type="presOf" srcId="{E4BAB214-F282-46A9-895A-D9BD0E84DB3F}" destId="{5F110DA3-1DE8-4F12-A68F-86C4A5BF1E8C}" srcOrd="0" destOrd="0" presId="urn:microsoft.com/office/officeart/2005/8/layout/hierarchy3"/>
+    <dgm:cxn modelId="{E82A3251-91DA-4815-893B-2CB56E9913F8}" type="presOf" srcId="{37769943-29F6-4B68-A449-5DEE7577C941}" destId="{6CF04F40-20BC-4EE2-A8E0-91CE9C5F4FA8}" srcOrd="0" destOrd="0" presId="urn:microsoft.com/office/officeart/2005/8/layout/hierarchy3"/>
+    <dgm:cxn modelId="{C1C2960F-E59B-4440-A2DC-E6C8222CBDEE}" srcId="{D23EB86A-71BB-4A40-A569-8B77FDBE02FA}" destId="{C1E12F4A-6EB8-4EF1-9A2E-60BEBFA81592}" srcOrd="1" destOrd="0" parTransId="{3839A656-D98B-47E9-A658-DF73304CEB18}" sibTransId="{22D1E09B-DC05-4745-B8F2-30FA2BC8B359}"/>
+    <dgm:cxn modelId="{04D223AD-2624-412D-ADE6-DA2BEFC8FCB6}" type="presOf" srcId="{8BD967C0-A55D-48F9-95B1-733E8F50B17C}" destId="{0B3358E2-26D5-461E-AD31-7A4654034337}" srcOrd="0" destOrd="0" presId="urn:microsoft.com/office/officeart/2005/8/layout/hierarchy3"/>
+    <dgm:cxn modelId="{4FD3DC13-0721-431D-8738-4EDFC6E8A940}" type="presOf" srcId="{26EAFC01-7D93-44D6-B927-7C773411E24C}" destId="{0E7FBF3B-7D1F-4A68-8FFB-C953C781DE15}" srcOrd="0" destOrd="0" presId="urn:microsoft.com/office/officeart/2005/8/layout/hierarchy3"/>
+    <dgm:cxn modelId="{36B9DA8C-A689-4553-832D-61EB7B85622D}" srcId="{D23EB86A-71BB-4A40-A569-8B77FDBE02FA}" destId="{52572F2B-AAE6-4BE9-9BBD-CB4C6B7CD675}" srcOrd="6" destOrd="0" parTransId="{D28794C1-D31F-40DE-AE24-412233A7CACB}" sibTransId="{77A8EC62-DEC3-4292-ABC8-A6168E4C97F0}"/>
+    <dgm:cxn modelId="{7D6FF0F7-548D-4CE5-8A7E-1EB8380B0229}" type="presOf" srcId="{C1E12F4A-6EB8-4EF1-9A2E-60BEBFA81592}" destId="{4BFBAF82-2A9D-4DC1-A988-0880718FA259}" srcOrd="0" destOrd="0" presId="urn:microsoft.com/office/officeart/2005/8/layout/hierarchy3"/>
+    <dgm:cxn modelId="{E6C387B6-7931-4BB6-ABF0-EC9F8067348D}" type="presOf" srcId="{3839A656-D98B-47E9-A658-DF73304CEB18}" destId="{E91EC1B8-A184-48D1-9A69-E934B5C7B28A}" srcOrd="0" destOrd="0" presId="urn:microsoft.com/office/officeart/2005/8/layout/hierarchy3"/>
+    <dgm:cxn modelId="{4153DA9D-BE1A-43D1-84E0-B20DC04273A1}" type="presOf" srcId="{B66C6E76-A77D-4BAE-A190-E7C7B99630D5}" destId="{06CA16BD-3E66-4C53-92B0-52C52AD63648}" srcOrd="1" destOrd="0" presId="urn:microsoft.com/office/officeart/2005/8/layout/hierarchy3"/>
+    <dgm:cxn modelId="{6790B4E7-E0EE-41EB-945C-C376AB2B23D3}" type="presOf" srcId="{EFA38823-71A3-47C6-B0F4-1CB6C01186B4}" destId="{7FB5A010-9A56-4829-B858-D0D824AEF6AD}" srcOrd="0" destOrd="0" presId="urn:microsoft.com/office/officeart/2005/8/layout/hierarchy3"/>
+    <dgm:cxn modelId="{0B714DB5-1905-4C10-B2C3-52DE000CC7EE}" type="presOf" srcId="{2B7155C7-BEBA-47E6-A611-578103620110}" destId="{3548ED33-673B-47FB-8DF9-F219CFA710BC}" srcOrd="0" destOrd="0" presId="urn:microsoft.com/office/officeart/2005/8/layout/hierarchy3"/>
+    <dgm:cxn modelId="{4E9237CA-E46C-41CD-95BD-742F8950EEB9}" srcId="{B66C6E76-A77D-4BAE-A190-E7C7B99630D5}" destId="{95D8C2BB-FFF3-4F61-8445-6BF1251A0DDC}" srcOrd="3" destOrd="0" parTransId="{391C7100-F7CB-404F-9784-D4A0A18ED1F2}" sibTransId="{18C0857F-72C1-4B18-89F2-5D3B4F04A762}"/>
     <dgm:cxn modelId="{B9A282EA-EB5D-4740-A114-7A5FDEC3F13F}" type="presOf" srcId="{1D5B013C-3814-4DBA-A114-793515C3A175}" destId="{36E41940-D6AE-4B61-9614-578943ADDEBE}" srcOrd="0" destOrd="0" presId="urn:microsoft.com/office/officeart/2005/8/layout/hierarchy3"/>
+    <dgm:cxn modelId="{0FFF8C14-2898-4723-981D-EC8EE61DB3B7}" type="presOf" srcId="{548E3DBA-F067-4E78-8538-35AFB2F1818B}" destId="{831964B1-E01A-4C78-9158-C8D63428B7DA}" srcOrd="0" destOrd="0" presId="urn:microsoft.com/office/officeart/2005/8/layout/hierarchy3"/>
+    <dgm:cxn modelId="{9C9BE23E-6612-44C5-9CFE-9CC7832BF2A5}" srcId="{D23EB86A-71BB-4A40-A569-8B77FDBE02FA}" destId="{D29747DE-81BE-44CC-ADFA-D349E8B24264}" srcOrd="3" destOrd="0" parTransId="{DA8DF7CA-1898-479A-AB8B-30F622A20386}" sibTransId="{F71EDA71-5AF9-41DC-841C-C32CB38CA494}"/>
+    <dgm:cxn modelId="{63DAAF5A-D4FF-4C0A-9DE7-FE4E42A34343}" srcId="{B66C6E76-A77D-4BAE-A190-E7C7B99630D5}" destId="{6D187876-D73A-4DA0-8A96-0B77CF7C51D8}" srcOrd="2" destOrd="0" parTransId="{E37E2F2F-CD39-482B-9878-0ED5657CF008}" sibTransId="{EE27B221-B777-430B-861D-692C62998E99}"/>
+    <dgm:cxn modelId="{0DAEDA3B-FE33-4B1C-9C27-E2E206218952}" srcId="{D23EB86A-71BB-4A40-A569-8B77FDBE02FA}" destId="{2B7155C7-BEBA-47E6-A611-578103620110}" srcOrd="4" destOrd="0" parTransId="{3F425AB1-C509-4C12-835D-8FB48463C56E}" sibTransId="{838E31E3-BBA0-4DFD-8508-33E3D64F2DF2}"/>
+    <dgm:cxn modelId="{126129EF-FD55-4092-A572-7657075334A6}" type="presOf" srcId="{95D8C2BB-FFF3-4F61-8445-6BF1251A0DDC}" destId="{50E43E93-9EF6-4576-8695-D64977549991}" srcOrd="0" destOrd="0" presId="urn:microsoft.com/office/officeart/2005/8/layout/hierarchy3"/>
+    <dgm:cxn modelId="{76A55E50-AF99-47A3-9455-AAFCB2256592}" srcId="{D23EB86A-71BB-4A40-A569-8B77FDBE02FA}" destId="{EE83A711-B233-4784-8790-B3D0B5AA4273}" srcOrd="2" destOrd="0" parTransId="{37769943-29F6-4B68-A449-5DEE7577C941}" sibTransId="{A43C7F0B-AC09-44C4-A7DC-DA92D0A575C5}"/>
+    <dgm:cxn modelId="{C63FD1B0-EEE3-4366-A02B-3EBF816D33FA}" srcId="{B66C6E76-A77D-4BAE-A190-E7C7B99630D5}" destId="{EFA38823-71A3-47C6-B0F4-1CB6C01186B4}" srcOrd="5" destOrd="0" parTransId="{6D2CB1FD-153F-413A-9094-97A8C82D1A59}" sibTransId="{F36243A3-0694-4470-B3FF-00EC19796C92}"/>
+    <dgm:cxn modelId="{4BA34B07-DA3A-4E4B-B5DC-913EF5747AE2}" type="presOf" srcId="{1317B38D-2A30-4107-9F27-1500BCF7FC6F}" destId="{4F01DEA1-6963-411C-B81A-F6998C0C045E}" srcOrd="0" destOrd="0" presId="urn:microsoft.com/office/officeart/2005/8/layout/hierarchy3"/>
+    <dgm:cxn modelId="{C765AA97-1366-4652-8C13-4650968F60CF}" type="presOf" srcId="{2532EC49-0FBE-4774-B31A-BBBB468170F7}" destId="{630F3D18-F2FD-492C-B34C-7F4ABA982010}" srcOrd="0" destOrd="0" presId="urn:microsoft.com/office/officeart/2005/8/layout/hierarchy3"/>
+    <dgm:cxn modelId="{9BEBC980-A36E-4C4A-A8DA-4CB6EEA808A1}" srcId="{D23EB86A-71BB-4A40-A569-8B77FDBE02FA}" destId="{548E3DBA-F067-4E78-8538-35AFB2F1818B}" srcOrd="5" destOrd="0" parTransId="{27188142-555D-4CE0-8FCC-5EF4E1AE4524}" sibTransId="{8FD1163F-C701-4469-B412-1D17C50819E9}"/>
+    <dgm:cxn modelId="{F989FA39-FD22-4920-A3AF-2C476F51F7CD}" type="presOf" srcId="{D28794C1-D31F-40DE-AE24-412233A7CACB}" destId="{CC93376A-112F-470C-A92E-6B9C4768A381}" srcOrd="0" destOrd="0" presId="urn:microsoft.com/office/officeart/2005/8/layout/hierarchy3"/>
+    <dgm:cxn modelId="{10F3401B-B541-4202-8EB4-FC6B333D53C3}" type="presOf" srcId="{7B27C1B8-5A68-42C8-A979-98E005722E76}" destId="{665B2015-8348-4619-A88A-458FE46C5216}" srcOrd="0" destOrd="0" presId="urn:microsoft.com/office/officeart/2005/8/layout/hierarchy3"/>
+    <dgm:cxn modelId="{61C9982F-CD29-461E-B7A2-844320B3320E}" type="presOf" srcId="{D29747DE-81BE-44CC-ADFA-D349E8B24264}" destId="{8C1715B6-BA7B-438E-97EB-8AEC5ECBF87A}" srcOrd="0" destOrd="0" presId="urn:microsoft.com/office/officeart/2005/8/layout/hierarchy3"/>
+    <dgm:cxn modelId="{AB861BCE-5919-4B0A-A9F5-9564E777362E}" type="presOf" srcId="{52572F2B-AAE6-4BE9-9BBD-CB4C6B7CD675}" destId="{A5E6D460-1049-4DD1-B5F1-BB5A03E46C6F}" srcOrd="0" destOrd="0" presId="urn:microsoft.com/office/officeart/2005/8/layout/hierarchy3"/>
+    <dgm:cxn modelId="{C21777D7-7565-44BF-85F7-0C02E051AAA0}" type="presOf" srcId="{B66C6E76-A77D-4BAE-A190-E7C7B99630D5}" destId="{2D6695BE-25C1-46C7-8352-964F3DB123E4}" srcOrd="0" destOrd="0" presId="urn:microsoft.com/office/officeart/2005/8/layout/hierarchy3"/>
+    <dgm:cxn modelId="{77917A58-C306-4CDB-9728-8CABB9E90F23}" srcId="{B66C6E76-A77D-4BAE-A190-E7C7B99630D5}" destId="{E4BAB214-F282-46A9-895A-D9BD0E84DB3F}" srcOrd="4" destOrd="0" parTransId="{1317B38D-2A30-4107-9F27-1500BCF7FC6F}" sibTransId="{DE121C5A-11BE-40E6-8198-0350C8D6F7E3}"/>
+    <dgm:cxn modelId="{775362DD-7045-4F1C-AA3F-3062D1029467}" type="presOf" srcId="{D23EB86A-71BB-4A40-A569-8B77FDBE02FA}" destId="{A75A51E0-87EF-40A0-961A-12248580B45C}" srcOrd="1" destOrd="0" presId="urn:microsoft.com/office/officeart/2005/8/layout/hierarchy3"/>
+    <dgm:cxn modelId="{DE2D8074-B02B-4163-ABB6-4E5E83ACBA7D}" srcId="{2532EC49-0FBE-4774-B31A-BBBB468170F7}" destId="{B66C6E76-A77D-4BAE-A190-E7C7B99630D5}" srcOrd="1" destOrd="0" parTransId="{B563D8E4-CC74-46B1-AD2F-0A19BF88D530}" sibTransId="{3A1A347E-7FA0-4BF5-BF25-0A9BF0BDF025}"/>
+    <dgm:cxn modelId="{C700B7A0-B850-465C-92CF-40C1B3CB7820}" srcId="{D23EB86A-71BB-4A40-A569-8B77FDBE02FA}" destId="{E37FFE57-7D3E-4712-B6FD-24123D60E026}" srcOrd="0" destOrd="0" parTransId="{1D5B013C-3814-4DBA-A114-793515C3A175}" sibTransId="{58BF5B3D-7E93-45F1-9609-42AD7A3F58C9}"/>
+    <dgm:cxn modelId="{AF1A09EC-49C6-4006-B436-7A9942329C9D}" type="presOf" srcId="{49F53E7A-EFE3-49C9-BF91-10D4091DFF4B}" destId="{6817C1B7-11FB-4758-B864-210D01678FDC}" srcOrd="0" destOrd="0" presId="urn:microsoft.com/office/officeart/2005/8/layout/hierarchy3"/>
+    <dgm:cxn modelId="{C6AEAA7A-BF9A-4195-B4A4-5F0A6B9FD8BF}" type="presOf" srcId="{6D187876-D73A-4DA0-8A96-0B77CF7C51D8}" destId="{548B7762-B5B8-4C69-88AE-F72473B32CBC}" srcOrd="0" destOrd="0" presId="urn:microsoft.com/office/officeart/2005/8/layout/hierarchy3"/>
+    <dgm:cxn modelId="{8DBEE0CF-9820-4CCB-9C43-3E263D8F0A78}" type="presOf" srcId="{27188142-555D-4CE0-8FCC-5EF4E1AE4524}" destId="{4A64C365-06C2-46B7-B947-59EF5BE39B6D}" srcOrd="0" destOrd="0" presId="urn:microsoft.com/office/officeart/2005/8/layout/hierarchy3"/>
+    <dgm:cxn modelId="{C93775F6-F432-4330-8A6D-42759A0EB22C}" srcId="{B66C6E76-A77D-4BAE-A190-E7C7B99630D5}" destId="{26EAFC01-7D93-44D6-B927-7C773411E24C}" srcOrd="1" destOrd="0" parTransId="{8BD967C0-A55D-48F9-95B1-733E8F50B17C}" sibTransId="{DDE37BE1-2D8B-4961-ACB4-7512244992A5}"/>
+    <dgm:cxn modelId="{8212B852-43EB-4FCB-93B4-34B834DF133D}" srcId="{B66C6E76-A77D-4BAE-A190-E7C7B99630D5}" destId="{49F53E7A-EFE3-49C9-BF91-10D4091DFF4B}" srcOrd="0" destOrd="0" parTransId="{7B27C1B8-5A68-42C8-A979-98E005722E76}" sibTransId="{A06AD473-1F5F-4C00-8E2A-03122FCC05B6}"/>
+    <dgm:cxn modelId="{8CE7A1E4-01AE-4101-A0D1-215458C22FFF}" type="presOf" srcId="{391C7100-F7CB-404F-9784-D4A0A18ED1F2}" destId="{D69BB881-E2F5-44B9-9DBD-6D90C7DB7496}" srcOrd="0" destOrd="0" presId="urn:microsoft.com/office/officeart/2005/8/layout/hierarchy3"/>
     <dgm:cxn modelId="{3D0A4717-B8D7-4576-9FA5-10F0E5488DE9}" type="presOf" srcId="{D23EB86A-71BB-4A40-A569-8B77FDBE02FA}" destId="{72B13844-B30E-425B-9C7A-1663396A215A}" srcOrd="0" destOrd="0" presId="urn:microsoft.com/office/officeart/2005/8/layout/hierarchy3"/>
-    <dgm:cxn modelId="{0DAEDA3B-FE33-4B1C-9C27-E2E206218952}" srcId="{D23EB86A-71BB-4A40-A569-8B77FDBE02FA}" destId="{2B7155C7-BEBA-47E6-A611-578103620110}" srcOrd="4" destOrd="0" parTransId="{3F425AB1-C509-4C12-835D-8FB48463C56E}" sibTransId="{838E31E3-BBA0-4DFD-8508-33E3D64F2DF2}"/>
-    <dgm:cxn modelId="{9BEBC980-A36E-4C4A-A8DA-4CB6EEA808A1}" srcId="{D23EB86A-71BB-4A40-A569-8B77FDBE02FA}" destId="{548E3DBA-F067-4E78-8538-35AFB2F1818B}" srcOrd="5" destOrd="0" parTransId="{27188142-555D-4CE0-8FCC-5EF4E1AE4524}" sibTransId="{8FD1163F-C701-4469-B412-1D17C50819E9}"/>
-    <dgm:cxn modelId="{E6C387B6-7931-4BB6-ABF0-EC9F8067348D}" type="presOf" srcId="{3839A656-D98B-47E9-A658-DF73304CEB18}" destId="{E91EC1B8-A184-48D1-9A69-E934B5C7B28A}" srcOrd="0" destOrd="0" presId="urn:microsoft.com/office/officeart/2005/8/layout/hierarchy3"/>
+    <dgm:cxn modelId="{B7DA8A26-DCF4-479F-8D62-54606673305A}" type="presOf" srcId="{3F425AB1-C509-4C12-835D-8FB48463C56E}" destId="{B128F964-9EE8-46FF-B519-C8284E2BB040}" srcOrd="0" destOrd="0" presId="urn:microsoft.com/office/officeart/2005/8/layout/hierarchy3"/>
+    <dgm:cxn modelId="{5ECC07F0-D5CC-4968-A0C6-9C1D48CA3C36}" srcId="{2532EC49-0FBE-4774-B31A-BBBB468170F7}" destId="{D23EB86A-71BB-4A40-A569-8B77FDBE02FA}" srcOrd="0" destOrd="0" parTransId="{6D067A31-E2BD-456C-9D7E-4D8644E3311A}" sibTransId="{D4EEEF3F-A295-43A8-97BA-8D293266F8CC}"/>
+    <dgm:cxn modelId="{1AF40643-3595-471D-A426-BD67B82D5BD6}" type="presOf" srcId="{E37FFE57-7D3E-4712-B6FD-24123D60E026}" destId="{62B5FB75-42A9-43BC-8FD2-7AB5067B12F7}" srcOrd="0" destOrd="0" presId="urn:microsoft.com/office/officeart/2005/8/layout/hierarchy3"/>
     <dgm:cxn modelId="{C571757F-977E-42C8-9358-F310B414AE16}" type="presOf" srcId="{EE83A711-B233-4784-8790-B3D0B5AA4273}" destId="{7E81931F-3C81-4DB3-82D5-109D76282892}" srcOrd="0" destOrd="0" presId="urn:microsoft.com/office/officeart/2005/8/layout/hierarchy3"/>
-    <dgm:cxn modelId="{10F3401B-B541-4202-8EB4-FC6B333D53C3}" type="presOf" srcId="{7B27C1B8-5A68-42C8-A979-98E005722E76}" destId="{665B2015-8348-4619-A88A-458FE46C5216}" srcOrd="0" destOrd="0" presId="urn:microsoft.com/office/officeart/2005/8/layout/hierarchy3"/>
-    <dgm:cxn modelId="{04D223AD-2624-412D-ADE6-DA2BEFC8FCB6}" type="presOf" srcId="{8BD967C0-A55D-48F9-95B1-733E8F50B17C}" destId="{0B3358E2-26D5-461E-AD31-7A4654034337}" srcOrd="0" destOrd="0" presId="urn:microsoft.com/office/officeart/2005/8/layout/hierarchy3"/>
-    <dgm:cxn modelId="{C765AA97-1366-4652-8C13-4650968F60CF}" type="presOf" srcId="{2532EC49-0FBE-4774-B31A-BBBB468170F7}" destId="{630F3D18-F2FD-492C-B34C-7F4ABA982010}" srcOrd="0" destOrd="0" presId="urn:microsoft.com/office/officeart/2005/8/layout/hierarchy3"/>
-    <dgm:cxn modelId="{4153DA9D-BE1A-43D1-84E0-B20DC04273A1}" type="presOf" srcId="{B66C6E76-A77D-4BAE-A190-E7C7B99630D5}" destId="{06CA16BD-3E66-4C53-92B0-52C52AD63648}" srcOrd="1" destOrd="0" presId="urn:microsoft.com/office/officeart/2005/8/layout/hierarchy3"/>
-    <dgm:cxn modelId="{77917A58-C306-4CDB-9728-8CABB9E90F23}" srcId="{B66C6E76-A77D-4BAE-A190-E7C7B99630D5}" destId="{E4BAB214-F282-46A9-895A-D9BD0E84DB3F}" srcOrd="4" destOrd="0" parTransId="{1317B38D-2A30-4107-9F27-1500BCF7FC6F}" sibTransId="{DE121C5A-11BE-40E6-8198-0350C8D6F7E3}"/>
-    <dgm:cxn modelId="{6790B4E7-E0EE-41EB-945C-C376AB2B23D3}" type="presOf" srcId="{EFA38823-71A3-47C6-B0F4-1CB6C01186B4}" destId="{7FB5A010-9A56-4829-B858-D0D824AEF6AD}" srcOrd="0" destOrd="0" presId="urn:microsoft.com/office/officeart/2005/8/layout/hierarchy3"/>
-    <dgm:cxn modelId="{8CE7A1E4-01AE-4101-A0D1-215458C22FFF}" type="presOf" srcId="{391C7100-F7CB-404F-9784-D4A0A18ED1F2}" destId="{D69BB881-E2F5-44B9-9DBD-6D90C7DB7496}" srcOrd="0" destOrd="0" presId="urn:microsoft.com/office/officeart/2005/8/layout/hierarchy3"/>
-    <dgm:cxn modelId="{C700B7A0-B850-465C-92CF-40C1B3CB7820}" srcId="{D23EB86A-71BB-4A40-A569-8B77FDBE02FA}" destId="{E37FFE57-7D3E-4712-B6FD-24123D60E026}" srcOrd="0" destOrd="0" parTransId="{1D5B013C-3814-4DBA-A114-793515C3A175}" sibTransId="{58BF5B3D-7E93-45F1-9609-42AD7A3F58C9}"/>
-    <dgm:cxn modelId="{8DBEE0CF-9820-4CCB-9C43-3E263D8F0A78}" type="presOf" srcId="{27188142-555D-4CE0-8FCC-5EF4E1AE4524}" destId="{4A64C365-06C2-46B7-B947-59EF5BE39B6D}" srcOrd="0" destOrd="0" presId="urn:microsoft.com/office/officeart/2005/8/layout/hierarchy3"/>
-    <dgm:cxn modelId="{A72944CA-EA98-4912-BD8E-D7A0B9B4AAED}" type="presOf" srcId="{E4BAB214-F282-46A9-895A-D9BD0E84DB3F}" destId="{5F110DA3-1DE8-4F12-A68F-86C4A5BF1E8C}" srcOrd="0" destOrd="0" presId="urn:microsoft.com/office/officeart/2005/8/layout/hierarchy3"/>
-    <dgm:cxn modelId="{63DAAF5A-D4FF-4C0A-9DE7-FE4E42A34343}" srcId="{B66C6E76-A77D-4BAE-A190-E7C7B99630D5}" destId="{6D187876-D73A-4DA0-8A96-0B77CF7C51D8}" srcOrd="2" destOrd="0" parTransId="{E37E2F2F-CD39-482B-9878-0ED5657CF008}" sibTransId="{EE27B221-B777-430B-861D-692C62998E99}"/>
-    <dgm:cxn modelId="{8212B852-43EB-4FCB-93B4-34B834DF133D}" srcId="{B66C6E76-A77D-4BAE-A190-E7C7B99630D5}" destId="{49F53E7A-EFE3-49C9-BF91-10D4091DFF4B}" srcOrd="0" destOrd="0" parTransId="{7B27C1B8-5A68-42C8-A979-98E005722E76}" sibTransId="{A06AD473-1F5F-4C00-8E2A-03122FCC05B6}"/>
-    <dgm:cxn modelId="{E82A3251-91DA-4815-893B-2CB56E9913F8}" type="presOf" srcId="{37769943-29F6-4B68-A449-5DEE7577C941}" destId="{6CF04F40-20BC-4EE2-A8E0-91CE9C5F4FA8}" srcOrd="0" destOrd="0" presId="urn:microsoft.com/office/officeart/2005/8/layout/hierarchy3"/>
     <dgm:cxn modelId="{F3019377-656E-4845-BB8D-F38DE89FFE4F}" type="presOf" srcId="{E37E2F2F-CD39-482B-9878-0ED5657CF008}" destId="{2F157E92-6736-4A13-A6CB-BE96A53AFD9F}" srcOrd="0" destOrd="0" presId="urn:microsoft.com/office/officeart/2005/8/layout/hierarchy3"/>
-    <dgm:cxn modelId="{0FFF8C14-2898-4723-981D-EC8EE61DB3B7}" type="presOf" srcId="{548E3DBA-F067-4E78-8538-35AFB2F1818B}" destId="{831964B1-E01A-4C78-9158-C8D63428B7DA}" srcOrd="0" destOrd="0" presId="urn:microsoft.com/office/officeart/2005/8/layout/hierarchy3"/>
-    <dgm:cxn modelId="{1AF40643-3595-471D-A426-BD67B82D5BD6}" type="presOf" srcId="{E37FFE57-7D3E-4712-B6FD-24123D60E026}" destId="{62B5FB75-42A9-43BC-8FD2-7AB5067B12F7}" srcOrd="0" destOrd="0" presId="urn:microsoft.com/office/officeart/2005/8/layout/hierarchy3"/>
-    <dgm:cxn modelId="{AF1A09EC-49C6-4006-B436-7A9942329C9D}" type="presOf" srcId="{49F53E7A-EFE3-49C9-BF91-10D4091DFF4B}" destId="{6817C1B7-11FB-4758-B864-210D01678FDC}" srcOrd="0" destOrd="0" presId="urn:microsoft.com/office/officeart/2005/8/layout/hierarchy3"/>
-    <dgm:cxn modelId="{76A55E50-AF99-47A3-9455-AAFCB2256592}" srcId="{D23EB86A-71BB-4A40-A569-8B77FDBE02FA}" destId="{EE83A711-B233-4784-8790-B3D0B5AA4273}" srcOrd="2" destOrd="0" parTransId="{37769943-29F6-4B68-A449-5DEE7577C941}" sibTransId="{A43C7F0B-AC09-44C4-A7DC-DA92D0A575C5}"/>
-    <dgm:cxn modelId="{0B714DB5-1905-4C10-B2C3-52DE000CC7EE}" type="presOf" srcId="{2B7155C7-BEBA-47E6-A611-578103620110}" destId="{3548ED33-673B-47FB-8DF9-F219CFA710BC}" srcOrd="0" destOrd="0" presId="urn:microsoft.com/office/officeart/2005/8/layout/hierarchy3"/>
-    <dgm:cxn modelId="{DE2D8074-B02B-4163-ABB6-4E5E83ACBA7D}" srcId="{2532EC49-0FBE-4774-B31A-BBBB468170F7}" destId="{B66C6E76-A77D-4BAE-A190-E7C7B99630D5}" srcOrd="1" destOrd="0" parTransId="{B563D8E4-CC74-46B1-AD2F-0A19BF88D530}" sibTransId="{3A1A347E-7FA0-4BF5-BF25-0A9BF0BDF025}"/>
-    <dgm:cxn modelId="{4E9237CA-E46C-41CD-95BD-742F8950EEB9}" srcId="{B66C6E76-A77D-4BAE-A190-E7C7B99630D5}" destId="{95D8C2BB-FFF3-4F61-8445-6BF1251A0DDC}" srcOrd="3" destOrd="0" parTransId="{391C7100-F7CB-404F-9784-D4A0A18ED1F2}" sibTransId="{18C0857F-72C1-4B18-89F2-5D3B4F04A762}"/>
-    <dgm:cxn modelId="{4FD3DC13-0721-431D-8738-4EDFC6E8A940}" type="presOf" srcId="{26EAFC01-7D93-44D6-B927-7C773411E24C}" destId="{0E7FBF3B-7D1F-4A68-8FFB-C953C781DE15}" srcOrd="0" destOrd="0" presId="urn:microsoft.com/office/officeart/2005/8/layout/hierarchy3"/>
-    <dgm:cxn modelId="{4BA34B07-DA3A-4E4B-B5DC-913EF5747AE2}" type="presOf" srcId="{1317B38D-2A30-4107-9F27-1500BCF7FC6F}" destId="{4F01DEA1-6963-411C-B81A-F6998C0C045E}" srcOrd="0" destOrd="0" presId="urn:microsoft.com/office/officeart/2005/8/layout/hierarchy3"/>
-    <dgm:cxn modelId="{C93775F6-F432-4330-8A6D-42759A0EB22C}" srcId="{B66C6E76-A77D-4BAE-A190-E7C7B99630D5}" destId="{26EAFC01-7D93-44D6-B927-7C773411E24C}" srcOrd="1" destOrd="0" parTransId="{8BD967C0-A55D-48F9-95B1-733E8F50B17C}" sibTransId="{DDE37BE1-2D8B-4961-ACB4-7512244992A5}"/>
-    <dgm:cxn modelId="{950CD349-9C7F-4583-8ED7-AE6EB571A6CD}" type="presOf" srcId="{DA8DF7CA-1898-479A-AB8B-30F622A20386}" destId="{59F0254C-AFAD-4E3D-A8F7-6171D1D72BE5}" srcOrd="0" destOrd="0" presId="urn:microsoft.com/office/officeart/2005/8/layout/hierarchy3"/>
-    <dgm:cxn modelId="{F989FA39-FD22-4920-A3AF-2C476F51F7CD}" type="presOf" srcId="{D28794C1-D31F-40DE-AE24-412233A7CACB}" destId="{CC93376A-112F-470C-A92E-6B9C4768A381}" srcOrd="0" destOrd="0" presId="urn:microsoft.com/office/officeart/2005/8/layout/hierarchy3"/>
-    <dgm:cxn modelId="{C1C2960F-E59B-4440-A2DC-E6C8222CBDEE}" srcId="{D23EB86A-71BB-4A40-A569-8B77FDBE02FA}" destId="{C1E12F4A-6EB8-4EF1-9A2E-60BEBFA81592}" srcOrd="1" destOrd="0" parTransId="{3839A656-D98B-47E9-A658-DF73304CEB18}" sibTransId="{22D1E09B-DC05-4745-B8F2-30FA2BC8B359}"/>
-    <dgm:cxn modelId="{C21777D7-7565-44BF-85F7-0C02E051AAA0}" type="presOf" srcId="{B66C6E76-A77D-4BAE-A190-E7C7B99630D5}" destId="{2D6695BE-25C1-46C7-8352-964F3DB123E4}" srcOrd="0" destOrd="0" presId="urn:microsoft.com/office/officeart/2005/8/layout/hierarchy3"/>
-    <dgm:cxn modelId="{61C9982F-CD29-461E-B7A2-844320B3320E}" type="presOf" srcId="{D29747DE-81BE-44CC-ADFA-D349E8B24264}" destId="{8C1715B6-BA7B-438E-97EB-8AEC5ECBF87A}" srcOrd="0" destOrd="0" presId="urn:microsoft.com/office/officeart/2005/8/layout/hierarchy3"/>
-    <dgm:cxn modelId="{C63FD1B0-EEE3-4366-A02B-3EBF816D33FA}" srcId="{B66C6E76-A77D-4BAE-A190-E7C7B99630D5}" destId="{EFA38823-71A3-47C6-B0F4-1CB6C01186B4}" srcOrd="5" destOrd="0" parTransId="{6D2CB1FD-153F-413A-9094-97A8C82D1A59}" sibTransId="{F36243A3-0694-4470-B3FF-00EC19796C92}"/>
-    <dgm:cxn modelId="{B7DA8A26-DCF4-479F-8D62-54606673305A}" type="presOf" srcId="{3F425AB1-C509-4C12-835D-8FB48463C56E}" destId="{B128F964-9EE8-46FF-B519-C8284E2BB040}" srcOrd="0" destOrd="0" presId="urn:microsoft.com/office/officeart/2005/8/layout/hierarchy3"/>
-    <dgm:cxn modelId="{9C9BE23E-6612-44C5-9CFE-9CC7832BF2A5}" srcId="{D23EB86A-71BB-4A40-A569-8B77FDBE02FA}" destId="{D29747DE-81BE-44CC-ADFA-D349E8B24264}" srcOrd="3" destOrd="0" parTransId="{DA8DF7CA-1898-479A-AB8B-30F622A20386}" sibTransId="{F71EDA71-5AF9-41DC-841C-C32CB38CA494}"/>
-    <dgm:cxn modelId="{5ECC07F0-D5CC-4968-A0C6-9C1D48CA3C36}" srcId="{2532EC49-0FBE-4774-B31A-BBBB468170F7}" destId="{D23EB86A-71BB-4A40-A569-8B77FDBE02FA}" srcOrd="0" destOrd="0" parTransId="{6D067A31-E2BD-456C-9D7E-4D8644E3311A}" sibTransId="{D4EEEF3F-A295-43A8-97BA-8D293266F8CC}"/>
-    <dgm:cxn modelId="{775362DD-7045-4F1C-AA3F-3062D1029467}" type="presOf" srcId="{D23EB86A-71BB-4A40-A569-8B77FDBE02FA}" destId="{A75A51E0-87EF-40A0-961A-12248580B45C}" srcOrd="1" destOrd="0" presId="urn:microsoft.com/office/officeart/2005/8/layout/hierarchy3"/>
-    <dgm:cxn modelId="{C6AEAA7A-BF9A-4195-B4A4-5F0A6B9FD8BF}" type="presOf" srcId="{6D187876-D73A-4DA0-8A96-0B77CF7C51D8}" destId="{548B7762-B5B8-4C69-88AE-F72473B32CBC}" srcOrd="0" destOrd="0" presId="urn:microsoft.com/office/officeart/2005/8/layout/hierarchy3"/>
-    <dgm:cxn modelId="{7D6FF0F7-548D-4CE5-8A7E-1EB8380B0229}" type="presOf" srcId="{C1E12F4A-6EB8-4EF1-9A2E-60BEBFA81592}" destId="{4BFBAF82-2A9D-4DC1-A988-0880718FA259}" srcOrd="0" destOrd="0" presId="urn:microsoft.com/office/officeart/2005/8/layout/hierarchy3"/>
-    <dgm:cxn modelId="{126129EF-FD55-4092-A572-7657075334A6}" type="presOf" srcId="{95D8C2BB-FFF3-4F61-8445-6BF1251A0DDC}" destId="{50E43E93-9EF6-4576-8695-D64977549991}" srcOrd="0" destOrd="0" presId="urn:microsoft.com/office/officeart/2005/8/layout/hierarchy3"/>
-    <dgm:cxn modelId="{AB861BCE-5919-4B0A-A9F5-9564E777362E}" type="presOf" srcId="{52572F2B-AAE6-4BE9-9BBD-CB4C6B7CD675}" destId="{A5E6D460-1049-4DD1-B5F1-BB5A03E46C6F}" srcOrd="0" destOrd="0" presId="urn:microsoft.com/office/officeart/2005/8/layout/hierarchy3"/>
-    <dgm:cxn modelId="{A2F9B0F4-AA78-4158-8B2E-635DF7ACED91}" type="presOf" srcId="{6D2CB1FD-153F-413A-9094-97A8C82D1A59}" destId="{42A4DB9D-6604-49D8-A581-EB7995E16BE9}" srcOrd="0" destOrd="0" presId="urn:microsoft.com/office/officeart/2005/8/layout/hierarchy3"/>
-    <dgm:cxn modelId="{36B9DA8C-A689-4553-832D-61EB7B85622D}" srcId="{D23EB86A-71BB-4A40-A569-8B77FDBE02FA}" destId="{52572F2B-AAE6-4BE9-9BBD-CB4C6B7CD675}" srcOrd="6" destOrd="0" parTransId="{D28794C1-D31F-40DE-AE24-412233A7CACB}" sibTransId="{77A8EC62-DEC3-4292-ABC8-A6168E4C97F0}"/>
     <dgm:cxn modelId="{0AA03739-D2AB-4404-B06F-16926BA2ADE5}" type="presParOf" srcId="{630F3D18-F2FD-492C-B34C-7F4ABA982010}" destId="{95A8F5A5-B508-4717-9764-313C12304A7F}" srcOrd="0" destOrd="0" presId="urn:microsoft.com/office/officeart/2005/8/layout/hierarchy3"/>
     <dgm:cxn modelId="{2D7F8ACA-CF27-4639-B557-8DA473DB66FB}" type="presParOf" srcId="{95A8F5A5-B508-4717-9764-313C12304A7F}" destId="{98AA41C0-3CF6-433B-B897-F1DC4F31436D}" srcOrd="0" destOrd="0" presId="urn:microsoft.com/office/officeart/2005/8/layout/hierarchy3"/>
     <dgm:cxn modelId="{372AD94D-EE9D-4370-889F-61BD7C880DE7}" type="presParOf" srcId="{98AA41C0-3CF6-433B-B897-F1DC4F31436D}" destId="{72B13844-B30E-425B-9C7A-1663396A215A}" srcOrd="0" destOrd="0" presId="urn:microsoft.com/office/officeart/2005/8/layout/hierarchy3"/>
@@ -2895,7 +3088,23 @@
           </a:pPr>
           <a:r>
             <a:rPr lang="pt-PT" sz="700" kern="1200" dirty="0" smtClean="0"/>
-            <a:t>Possibility to do “nightly builds” – good to big projects</a:t>
+            <a:t>Possibility to do “nightly builds” – </a:t>
+          </a:r>
+          <a:r>
+            <a:rPr lang="pt-PT" sz="700" kern="1200" dirty="0" err="1" smtClean="0"/>
+            <a:t>good</a:t>
+          </a:r>
+          <a:r>
+            <a:rPr lang="pt-PT" sz="700" kern="1200" dirty="0" smtClean="0"/>
+            <a:t> </a:t>
+          </a:r>
+          <a:r>
+            <a:rPr lang="pt-PT" sz="700" kern="1200" dirty="0" smtClean="0"/>
+            <a:t>for </a:t>
+          </a:r>
+          <a:r>
+            <a:rPr lang="pt-PT" sz="700" kern="1200" dirty="0" smtClean="0"/>
+            <a:t>big projects</a:t>
           </a:r>
           <a:endParaRPr lang="pt-PT" sz="700" kern="1200" dirty="0"/>
         </a:p>
@@ -3125,7 +3334,23 @@
           </a:pPr>
           <a:r>
             <a:rPr lang="pt-PT" sz="700" kern="1200" dirty="0" smtClean="0"/>
-            <a:t>Too simplistic apresentation</a:t>
+            <a:t>Too </a:t>
+          </a:r>
+          <a:r>
+            <a:rPr lang="pt-PT" sz="700" kern="1200" dirty="0" err="1" smtClean="0"/>
+            <a:t>simplistic</a:t>
+          </a:r>
+          <a:r>
+            <a:rPr lang="pt-PT" sz="700" kern="1200" dirty="0" smtClean="0"/>
+            <a:t> </a:t>
+          </a:r>
+          <a:r>
+            <a:rPr lang="pt-PT" sz="700" kern="1200" dirty="0" smtClean="0"/>
+            <a:t>a </a:t>
+          </a:r>
+          <a:r>
+            <a:rPr lang="pt-PT" sz="700" kern="1200" dirty="0" err="1" smtClean="0"/>
+            <a:t>presentation</a:t>
           </a:r>
           <a:endParaRPr lang="pt-PT" sz="700" kern="1200" dirty="0"/>
         </a:p>
@@ -22752,7 +22977,11 @@
             <a:pPr algn="ctr"/>
             <a:r>
               <a:rPr lang="en-US" b="1" dirty="0" smtClean="0"/>
-              <a:t>How it works?</a:t>
+              <a:t>How </a:t>
+            </a:r>
+            <a:r>
+              <a:rPr lang="en-US" b="1" dirty="0" smtClean="0"/>
+              <a:t>does it work?</a:t>
             </a:r>
             <a:endParaRPr lang="en-US" b="1" dirty="0"/>
           </a:p>
@@ -24228,14 +24457,14 @@
           <p:nvPr>
             <p:extLst>
               <p:ext uri="{D42A27DB-BD31-4B8C-83A1-F6EECF244321}">
-                <p14:modId xmlns:p14="http://schemas.microsoft.com/office/powerpoint/2010/main" val="404894561"/>
+                <p14:modId xmlns:p14="http://schemas.microsoft.com/office/powerpoint/2010/main" val="212233197"/>
               </p:ext>
             </p:extLst>
           </p:nvPr>
         </p:nvGraphicFramePr>
         <p:xfrm>
           <a:off x="561111" y="2276874"/>
-          <a:ext cx="11080426" cy="4139653"/>
+          <a:ext cx="11080426" cy="4688293"/>
         </p:xfrm>
         <a:graphic>
           <a:graphicData uri="http://schemas.openxmlformats.org/drawingml/2006/table">
@@ -24463,7 +24692,11 @@
                     <a:bodyPr/>
                     <a:lstStyle/>
                     <a:p>
-                      <a:endParaRPr lang="pt-PT"/>
+                      <a:r>
+                        <a:rPr lang="pt-PT" dirty="0" err="1" smtClean="0"/>
+                        <a:t>None</a:t>
+                      </a:r>
+                      <a:endParaRPr lang="pt-PT" dirty="0"/>
                     </a:p>
                   </a:txBody>
                   <a:tcPr/>
@@ -24531,6 +24764,10 @@
                     <a:bodyPr/>
                     <a:lstStyle/>
                     <a:p>
+                      <a:r>
+                        <a:rPr lang="pt-PT" dirty="0" err="1" smtClean="0"/>
+                        <a:t>GitHub</a:t>
+                      </a:r>
                       <a:endParaRPr lang="pt-PT" dirty="0"/>
                     </a:p>
                   </a:txBody>
@@ -24591,7 +24828,11 @@
                     <a:bodyPr/>
                     <a:lstStyle/>
                     <a:p>
-                      <a:endParaRPr lang="pt-PT"/>
+                      <a:r>
+                        <a:rPr lang="pt-PT" dirty="0" smtClean="0"/>
+                        <a:t>YES</a:t>
+                      </a:r>
+                      <a:endParaRPr lang="pt-PT" dirty="0"/>
                     </a:p>
                   </a:txBody>
                   <a:tcPr/>
@@ -24651,6 +24892,10 @@
                     <a:bodyPr/>
                     <a:lstStyle/>
                     <a:p>
+                      <a:r>
+                        <a:rPr lang="pt-PT" dirty="0" smtClean="0"/>
+                        <a:t>NO</a:t>
+                      </a:r>
                       <a:endParaRPr lang="pt-PT" dirty="0"/>
                     </a:p>
                   </a:txBody>
@@ -24711,7 +24956,39 @@
                     <a:bodyPr/>
                     <a:lstStyle/>
                     <a:p>
-                      <a:endParaRPr lang="pt-PT"/>
+                      <a:r>
+                        <a:rPr lang="pt-PT" dirty="0" err="1" smtClean="0"/>
+                        <a:t>Good</a:t>
+                      </a:r>
+                      <a:r>
+                        <a:rPr lang="pt-PT" baseline="0" dirty="0" smtClean="0"/>
+                        <a:t> (</a:t>
+                      </a:r>
+                      <a:r>
+                        <a:rPr lang="pt-PT" baseline="0" dirty="0" err="1" smtClean="0"/>
+                        <a:t>and</a:t>
+                      </a:r>
+                      <a:r>
+                        <a:rPr lang="pt-PT" baseline="0" dirty="0" smtClean="0"/>
+                        <a:t> </a:t>
+                      </a:r>
+                      <a:r>
+                        <a:rPr lang="pt-PT" baseline="0" dirty="0" err="1" smtClean="0"/>
+                        <a:t>good</a:t>
+                      </a:r>
+                      <a:r>
+                        <a:rPr lang="pt-PT" baseline="0" dirty="0" smtClean="0"/>
+                        <a:t> </a:t>
+                      </a:r>
+                      <a:r>
+                        <a:rPr lang="pt-PT" baseline="0" dirty="0" err="1" smtClean="0"/>
+                        <a:t>community</a:t>
+                      </a:r>
+                      <a:r>
+                        <a:rPr lang="pt-PT" baseline="0" dirty="0" smtClean="0"/>
+                        <a:t>)</a:t>
+                      </a:r>
+                      <a:endParaRPr lang="pt-PT" dirty="0"/>
                     </a:p>
                   </a:txBody>
                   <a:tcPr/>
@@ -24958,11 +25235,7 @@
             </a:r>
             <a:r>
               <a:rPr lang="en-US" dirty="0" smtClean="0"/>
-              <a:t>Integration, </a:t>
-            </a:r>
-            <a:r>
-              <a:rPr lang="en-US" dirty="0" smtClean="0"/>
-              <a:t>2014</a:t>
+              <a:t>Integration, 2014</a:t>
             </a:r>
           </a:p>
           <a:p>
@@ -24978,6 +25251,45 @@
               </a:rPr>
               <a:t>www.quora.com/What-is-Jenkins-When-and-why-is-it-used</a:t>
             </a:r>
+            <a:endParaRPr lang="en-US" dirty="0" smtClean="0"/>
+          </a:p>
+          <a:p>
+            <a:r>
+              <a:rPr lang="en-US" dirty="0">
+                <a:hlinkClick r:id="rId5"/>
+              </a:rPr>
+              <a:t>https://travis-ci.org</a:t>
+            </a:r>
+            <a:r>
+              <a:rPr lang="en-US" dirty="0" smtClean="0">
+                <a:hlinkClick r:id="rId5"/>
+              </a:rPr>
+              <a:t>/</a:t>
+            </a:r>
+            <a:endParaRPr lang="en-US" dirty="0" smtClean="0"/>
+          </a:p>
+          <a:p>
+            <a:r>
+              <a:rPr lang="en-US">
+                <a:hlinkClick r:id="rId6"/>
+              </a:rPr>
+              <a:t>https</a:t>
+            </a:r>
+            <a:r>
+              <a:rPr lang="en-US">
+                <a:hlinkClick r:id="rId6"/>
+              </a:rPr>
+              <a:t>://</a:t>
+            </a:r>
+            <a:r>
+              <a:rPr lang="en-US" smtClean="0">
+                <a:hlinkClick r:id="rId6"/>
+              </a:rPr>
+              <a:t>docs.travis-ci.com/user/for-beginners</a:t>
+            </a:r>
+            <a:endParaRPr lang="en-US" smtClean="0"/>
+          </a:p>
+          <a:p>
             <a:endParaRPr lang="en-US" dirty="0" smtClean="0"/>
           </a:p>
           <a:p>
@@ -25069,7 +25381,7 @@
           <p:nvPr/>
         </p:nvPicPr>
         <p:blipFill>
-          <a:blip r:embed="rId5" cstate="print">
+          <a:blip r:embed="rId7" cstate="print">
             <a:extLst>
               <a:ext uri="{28A0092B-C50C-407E-A947-70E740481C1C}">
                 <a14:useLocalDpi xmlns:a14="http://schemas.microsoft.com/office/drawing/2010/main" val="0"/>
@@ -26035,7 +26347,6 @@
               <a:rPr lang="en-US" dirty="0" smtClean="0"/>
               <a:t>server</a:t>
             </a:r>
-            <a:endParaRPr lang="en-US" dirty="0" smtClean="0"/>
           </a:p>
           <a:p>
             <a:pPr>
@@ -26075,7 +26386,6 @@
               <a:rPr lang="en-US" dirty="0" smtClean="0"/>
               <a:t>others</a:t>
             </a:r>
-            <a:endParaRPr lang="en-US" dirty="0" smtClean="0"/>
           </a:p>
           <a:p>
             <a:pPr>
@@ -26356,25 +26666,12 @@
                   </a:outerShdw>
                 </a:effectLst>
               </a:rPr>
-              <a:t>Using </a:t>
-            </a:r>
-            <a:r>
-              <a:rPr lang="en-US" sz="2000" b="1" dirty="0" smtClean="0">
-                <a:effectLst>
-                  <a:outerShdw blurRad="38100" dist="38100" dir="2700000" algn="tl">
-                    <a:srgbClr val="000000">
-                      <a:alpha val="43137"/>
-                    </a:srgbClr>
-                  </a:outerShdw>
-                </a:effectLst>
-              </a:rPr>
-              <a:t>Jenkins: </a:t>
+              <a:t>Using Jenkins: </a:t>
             </a:r>
             <a:r>
               <a:rPr lang="en-US" sz="1600" b="1" dirty="0" smtClean="0"/>
               <a:t>REAL TESTIMONIES</a:t>
             </a:r>
-            <a:endParaRPr lang="en-US" sz="1600" b="1" dirty="0" smtClean="0"/>
           </a:p>
         </p:txBody>
       </p:sp>
@@ -26495,7 +26792,7 @@
           <p:nvPr>
             <p:extLst>
               <p:ext uri="{D42A27DB-BD31-4B8C-83A1-F6EECF244321}">
-                <p14:modId xmlns:p14="http://schemas.microsoft.com/office/powerpoint/2010/main" val="745041356"/>
+                <p14:modId xmlns:p14="http://schemas.microsoft.com/office/powerpoint/2010/main" val="3801013585"/>
               </p:ext>
             </p:extLst>
           </p:nvPr>
@@ -26579,20 +26876,12 @@
               <a:t>Hosted continuous integration server used to build and test software projects </a:t>
             </a:r>
             <a:r>
-              <a:rPr lang="en-US" dirty="0" err="1" smtClean="0"/>
-              <a:t>hosten</a:t>
-            </a:r>
-            <a:r>
               <a:rPr lang="en-US" dirty="0" smtClean="0"/>
-              <a:t> at </a:t>
-            </a:r>
-            <a:r>
-              <a:rPr lang="en-US" dirty="0" err="1" smtClean="0"/>
-              <a:t>GitHub</a:t>
+              <a:t>hosted </a:t>
             </a:r>
             <a:r>
               <a:rPr lang="en-US" dirty="0" smtClean="0"/>
-              <a:t>.</a:t>
+              <a:t>at GitHub.</a:t>
             </a:r>
           </a:p>
           <a:p>
@@ -26609,12 +26898,12 @@
               <a:t> </a:t>
             </a:r>
             <a:r>
-              <a:rPr lang="en-US" dirty="0" err="1" smtClean="0"/>
-              <a:t>whitch</a:t>
-            </a:r>
-            <a:r>
               <a:rPr lang="en-US" dirty="0" smtClean="0"/>
-              <a:t> sits along the project code.</a:t>
+              <a:t>which </a:t>
+            </a:r>
+            <a:r>
+              <a:rPr lang="en-US" dirty="0" smtClean="0"/>
+              <a:t>sits along the project code.</a:t>
             </a:r>
           </a:p>
           <a:p>
@@ -27287,7 +27576,11 @@
             <a:pPr algn="ctr"/>
             <a:r>
               <a:rPr lang="en-US" b="1" dirty="0" smtClean="0"/>
-              <a:t>What is?</a:t>
+              <a:t>What </a:t>
+            </a:r>
+            <a:r>
+              <a:rPr lang="en-US" b="1" dirty="0" smtClean="0"/>
+              <a:t>is it?</a:t>
             </a:r>
             <a:endParaRPr lang="en-US" b="1" dirty="0"/>
           </a:p>

</xml_diff>

<commit_message>
Preenchida tabela com dados do Bamboo.
</commit_message>
<xml_diff>
--- a/CI_TEAMC.pptx
+++ b/CI_TEAMC.pptx
@@ -126,7 +126,7 @@
   </p:defaultTextStyle>
   <p:extLst>
     <p:ext uri="{EFAFB233-063F-42B5-8137-9DF3F51BA10A}">
-      <p15:sldGuideLst xmlns:p15="http://schemas.microsoft.com/office/powerpoint/2012/main" xmlns="">
+      <p15:sldGuideLst xmlns:p15="http://schemas.microsoft.com/office/powerpoint/2012/main">
         <p15:guide id="1" pos="3840" userDrawn="1">
           <p15:clr>
             <a:srgbClr val="A4A3A4"/>
@@ -150,7 +150,7 @@
       </p15:sldGuideLst>
     </p:ext>
     <p:ext uri="{2D200454-40CA-4A62-9FC3-DE9A4176ACB9}">
-      <p15:notesGuideLst xmlns:p15="http://schemas.microsoft.com/office/powerpoint/2012/main" xmlns=""/>
+      <p15:notesGuideLst xmlns:p15="http://schemas.microsoft.com/office/powerpoint/2012/main"/>
     </p:ext>
   </p:extLst>
 </p:presentation>
@@ -162,7 +162,7 @@
   <p:cmAuthor id="3" name="Rita Silva" initials="RS" lastIdx="1" clrIdx="2">
     <p:extLst>
       <p:ext uri="{19B8F6BF-5375-455C-9EA6-DF929625EA0E}">
-        <p15:presenceInfo xmlns:p15="http://schemas.microsoft.com/office/powerpoint/2012/main" xmlns="" userId="S-1-5-21-37950563-1929341863-99485923-28026" providerId="AD"/>
+        <p15:presenceInfo xmlns:p15="http://schemas.microsoft.com/office/powerpoint/2012/main" userId="S-1-5-21-37950563-1929341863-99485923-28026" providerId="AD"/>
       </p:ext>
     </p:extLst>
   </p:cmAuthor>
@@ -1936,52 +1936,52 @@
     </dgm:pt>
   </dgm:ptLst>
   <dgm:cxnLst>
+    <dgm:cxn modelId="{B9A282EA-EB5D-4740-A114-7A5FDEC3F13F}" type="presOf" srcId="{1D5B013C-3814-4DBA-A114-793515C3A175}" destId="{36E41940-D6AE-4B61-9614-578943ADDEBE}" srcOrd="0" destOrd="0" presId="urn:microsoft.com/office/officeart/2005/8/layout/hierarchy3"/>
+    <dgm:cxn modelId="{3D0A4717-B8D7-4576-9FA5-10F0E5488DE9}" type="presOf" srcId="{D23EB86A-71BB-4A40-A569-8B77FDBE02FA}" destId="{72B13844-B30E-425B-9C7A-1663396A215A}" srcOrd="0" destOrd="0" presId="urn:microsoft.com/office/officeart/2005/8/layout/hierarchy3"/>
+    <dgm:cxn modelId="{0DAEDA3B-FE33-4B1C-9C27-E2E206218952}" srcId="{D23EB86A-71BB-4A40-A569-8B77FDBE02FA}" destId="{2B7155C7-BEBA-47E6-A611-578103620110}" srcOrd="4" destOrd="0" parTransId="{3F425AB1-C509-4C12-835D-8FB48463C56E}" sibTransId="{838E31E3-BBA0-4DFD-8508-33E3D64F2DF2}"/>
+    <dgm:cxn modelId="{9BEBC980-A36E-4C4A-A8DA-4CB6EEA808A1}" srcId="{D23EB86A-71BB-4A40-A569-8B77FDBE02FA}" destId="{548E3DBA-F067-4E78-8538-35AFB2F1818B}" srcOrd="5" destOrd="0" parTransId="{27188142-555D-4CE0-8FCC-5EF4E1AE4524}" sibTransId="{8FD1163F-C701-4469-B412-1D17C50819E9}"/>
+    <dgm:cxn modelId="{E6C387B6-7931-4BB6-ABF0-EC9F8067348D}" type="presOf" srcId="{3839A656-D98B-47E9-A658-DF73304CEB18}" destId="{E91EC1B8-A184-48D1-9A69-E934B5C7B28A}" srcOrd="0" destOrd="0" presId="urn:microsoft.com/office/officeart/2005/8/layout/hierarchy3"/>
+    <dgm:cxn modelId="{C571757F-977E-42C8-9358-F310B414AE16}" type="presOf" srcId="{EE83A711-B233-4784-8790-B3D0B5AA4273}" destId="{7E81931F-3C81-4DB3-82D5-109D76282892}" srcOrd="0" destOrd="0" presId="urn:microsoft.com/office/officeart/2005/8/layout/hierarchy3"/>
+    <dgm:cxn modelId="{10F3401B-B541-4202-8EB4-FC6B333D53C3}" type="presOf" srcId="{7B27C1B8-5A68-42C8-A979-98E005722E76}" destId="{665B2015-8348-4619-A88A-458FE46C5216}" srcOrd="0" destOrd="0" presId="urn:microsoft.com/office/officeart/2005/8/layout/hierarchy3"/>
+    <dgm:cxn modelId="{04D223AD-2624-412D-ADE6-DA2BEFC8FCB6}" type="presOf" srcId="{8BD967C0-A55D-48F9-95B1-733E8F50B17C}" destId="{0B3358E2-26D5-461E-AD31-7A4654034337}" srcOrd="0" destOrd="0" presId="urn:microsoft.com/office/officeart/2005/8/layout/hierarchy3"/>
+    <dgm:cxn modelId="{C765AA97-1366-4652-8C13-4650968F60CF}" type="presOf" srcId="{2532EC49-0FBE-4774-B31A-BBBB468170F7}" destId="{630F3D18-F2FD-492C-B34C-7F4ABA982010}" srcOrd="0" destOrd="0" presId="urn:microsoft.com/office/officeart/2005/8/layout/hierarchy3"/>
+    <dgm:cxn modelId="{4153DA9D-BE1A-43D1-84E0-B20DC04273A1}" type="presOf" srcId="{B66C6E76-A77D-4BAE-A190-E7C7B99630D5}" destId="{06CA16BD-3E66-4C53-92B0-52C52AD63648}" srcOrd="1" destOrd="0" presId="urn:microsoft.com/office/officeart/2005/8/layout/hierarchy3"/>
+    <dgm:cxn modelId="{77917A58-C306-4CDB-9728-8CABB9E90F23}" srcId="{B66C6E76-A77D-4BAE-A190-E7C7B99630D5}" destId="{E4BAB214-F282-46A9-895A-D9BD0E84DB3F}" srcOrd="4" destOrd="0" parTransId="{1317B38D-2A30-4107-9F27-1500BCF7FC6F}" sibTransId="{DE121C5A-11BE-40E6-8198-0350C8D6F7E3}"/>
+    <dgm:cxn modelId="{6790B4E7-E0EE-41EB-945C-C376AB2B23D3}" type="presOf" srcId="{EFA38823-71A3-47C6-B0F4-1CB6C01186B4}" destId="{7FB5A010-9A56-4829-B858-D0D824AEF6AD}" srcOrd="0" destOrd="0" presId="urn:microsoft.com/office/officeart/2005/8/layout/hierarchy3"/>
+    <dgm:cxn modelId="{8CE7A1E4-01AE-4101-A0D1-215458C22FFF}" type="presOf" srcId="{391C7100-F7CB-404F-9784-D4A0A18ED1F2}" destId="{D69BB881-E2F5-44B9-9DBD-6D90C7DB7496}" srcOrd="0" destOrd="0" presId="urn:microsoft.com/office/officeart/2005/8/layout/hierarchy3"/>
+    <dgm:cxn modelId="{C700B7A0-B850-465C-92CF-40C1B3CB7820}" srcId="{D23EB86A-71BB-4A40-A569-8B77FDBE02FA}" destId="{E37FFE57-7D3E-4712-B6FD-24123D60E026}" srcOrd="0" destOrd="0" parTransId="{1D5B013C-3814-4DBA-A114-793515C3A175}" sibTransId="{58BF5B3D-7E93-45F1-9609-42AD7A3F58C9}"/>
+    <dgm:cxn modelId="{A72944CA-EA98-4912-BD8E-D7A0B9B4AAED}" type="presOf" srcId="{E4BAB214-F282-46A9-895A-D9BD0E84DB3F}" destId="{5F110DA3-1DE8-4F12-A68F-86C4A5BF1E8C}" srcOrd="0" destOrd="0" presId="urn:microsoft.com/office/officeart/2005/8/layout/hierarchy3"/>
+    <dgm:cxn modelId="{8DBEE0CF-9820-4CCB-9C43-3E263D8F0A78}" type="presOf" srcId="{27188142-555D-4CE0-8FCC-5EF4E1AE4524}" destId="{4A64C365-06C2-46B7-B947-59EF5BE39B6D}" srcOrd="0" destOrd="0" presId="urn:microsoft.com/office/officeart/2005/8/layout/hierarchy3"/>
+    <dgm:cxn modelId="{63DAAF5A-D4FF-4C0A-9DE7-FE4E42A34343}" srcId="{B66C6E76-A77D-4BAE-A190-E7C7B99630D5}" destId="{6D187876-D73A-4DA0-8A96-0B77CF7C51D8}" srcOrd="2" destOrd="0" parTransId="{E37E2F2F-CD39-482B-9878-0ED5657CF008}" sibTransId="{EE27B221-B777-430B-861D-692C62998E99}"/>
+    <dgm:cxn modelId="{8212B852-43EB-4FCB-93B4-34B834DF133D}" srcId="{B66C6E76-A77D-4BAE-A190-E7C7B99630D5}" destId="{49F53E7A-EFE3-49C9-BF91-10D4091DFF4B}" srcOrd="0" destOrd="0" parTransId="{7B27C1B8-5A68-42C8-A979-98E005722E76}" sibTransId="{A06AD473-1F5F-4C00-8E2A-03122FCC05B6}"/>
+    <dgm:cxn modelId="{E82A3251-91DA-4815-893B-2CB56E9913F8}" type="presOf" srcId="{37769943-29F6-4B68-A449-5DEE7577C941}" destId="{6CF04F40-20BC-4EE2-A8E0-91CE9C5F4FA8}" srcOrd="0" destOrd="0" presId="urn:microsoft.com/office/officeart/2005/8/layout/hierarchy3"/>
+    <dgm:cxn modelId="{F3019377-656E-4845-BB8D-F38DE89FFE4F}" type="presOf" srcId="{E37E2F2F-CD39-482B-9878-0ED5657CF008}" destId="{2F157E92-6736-4A13-A6CB-BE96A53AFD9F}" srcOrd="0" destOrd="0" presId="urn:microsoft.com/office/officeart/2005/8/layout/hierarchy3"/>
+    <dgm:cxn modelId="{0FFF8C14-2898-4723-981D-EC8EE61DB3B7}" type="presOf" srcId="{548E3DBA-F067-4E78-8538-35AFB2F1818B}" destId="{831964B1-E01A-4C78-9158-C8D63428B7DA}" srcOrd="0" destOrd="0" presId="urn:microsoft.com/office/officeart/2005/8/layout/hierarchy3"/>
+    <dgm:cxn modelId="{1AF40643-3595-471D-A426-BD67B82D5BD6}" type="presOf" srcId="{E37FFE57-7D3E-4712-B6FD-24123D60E026}" destId="{62B5FB75-42A9-43BC-8FD2-7AB5067B12F7}" srcOrd="0" destOrd="0" presId="urn:microsoft.com/office/officeart/2005/8/layout/hierarchy3"/>
+    <dgm:cxn modelId="{AF1A09EC-49C6-4006-B436-7A9942329C9D}" type="presOf" srcId="{49F53E7A-EFE3-49C9-BF91-10D4091DFF4B}" destId="{6817C1B7-11FB-4758-B864-210D01678FDC}" srcOrd="0" destOrd="0" presId="urn:microsoft.com/office/officeart/2005/8/layout/hierarchy3"/>
+    <dgm:cxn modelId="{76A55E50-AF99-47A3-9455-AAFCB2256592}" srcId="{D23EB86A-71BB-4A40-A569-8B77FDBE02FA}" destId="{EE83A711-B233-4784-8790-B3D0B5AA4273}" srcOrd="2" destOrd="0" parTransId="{37769943-29F6-4B68-A449-5DEE7577C941}" sibTransId="{A43C7F0B-AC09-44C4-A7DC-DA92D0A575C5}"/>
+    <dgm:cxn modelId="{0B714DB5-1905-4C10-B2C3-52DE000CC7EE}" type="presOf" srcId="{2B7155C7-BEBA-47E6-A611-578103620110}" destId="{3548ED33-673B-47FB-8DF9-F219CFA710BC}" srcOrd="0" destOrd="0" presId="urn:microsoft.com/office/officeart/2005/8/layout/hierarchy3"/>
+    <dgm:cxn modelId="{DE2D8074-B02B-4163-ABB6-4E5E83ACBA7D}" srcId="{2532EC49-0FBE-4774-B31A-BBBB468170F7}" destId="{B66C6E76-A77D-4BAE-A190-E7C7B99630D5}" srcOrd="1" destOrd="0" parTransId="{B563D8E4-CC74-46B1-AD2F-0A19BF88D530}" sibTransId="{3A1A347E-7FA0-4BF5-BF25-0A9BF0BDF025}"/>
+    <dgm:cxn modelId="{4E9237CA-E46C-41CD-95BD-742F8950EEB9}" srcId="{B66C6E76-A77D-4BAE-A190-E7C7B99630D5}" destId="{95D8C2BB-FFF3-4F61-8445-6BF1251A0DDC}" srcOrd="3" destOrd="0" parTransId="{391C7100-F7CB-404F-9784-D4A0A18ED1F2}" sibTransId="{18C0857F-72C1-4B18-89F2-5D3B4F04A762}"/>
+    <dgm:cxn modelId="{4BA34B07-DA3A-4E4B-B5DC-913EF5747AE2}" type="presOf" srcId="{1317B38D-2A30-4107-9F27-1500BCF7FC6F}" destId="{4F01DEA1-6963-411C-B81A-F6998C0C045E}" srcOrd="0" destOrd="0" presId="urn:microsoft.com/office/officeart/2005/8/layout/hierarchy3"/>
+    <dgm:cxn modelId="{4FD3DC13-0721-431D-8738-4EDFC6E8A940}" type="presOf" srcId="{26EAFC01-7D93-44D6-B927-7C773411E24C}" destId="{0E7FBF3B-7D1F-4A68-8FFB-C953C781DE15}" srcOrd="0" destOrd="0" presId="urn:microsoft.com/office/officeart/2005/8/layout/hierarchy3"/>
     <dgm:cxn modelId="{950CD349-9C7F-4583-8ED7-AE6EB571A6CD}" type="presOf" srcId="{DA8DF7CA-1898-479A-AB8B-30F622A20386}" destId="{59F0254C-AFAD-4E3D-A8F7-6171D1D72BE5}" srcOrd="0" destOrd="0" presId="urn:microsoft.com/office/officeart/2005/8/layout/hierarchy3"/>
+    <dgm:cxn modelId="{C93775F6-F432-4330-8A6D-42759A0EB22C}" srcId="{B66C6E76-A77D-4BAE-A190-E7C7B99630D5}" destId="{26EAFC01-7D93-44D6-B927-7C773411E24C}" srcOrd="1" destOrd="0" parTransId="{8BD967C0-A55D-48F9-95B1-733E8F50B17C}" sibTransId="{DDE37BE1-2D8B-4961-ACB4-7512244992A5}"/>
+    <dgm:cxn modelId="{F989FA39-FD22-4920-A3AF-2C476F51F7CD}" type="presOf" srcId="{D28794C1-D31F-40DE-AE24-412233A7CACB}" destId="{CC93376A-112F-470C-A92E-6B9C4768A381}" srcOrd="0" destOrd="0" presId="urn:microsoft.com/office/officeart/2005/8/layout/hierarchy3"/>
+    <dgm:cxn modelId="{C1C2960F-E59B-4440-A2DC-E6C8222CBDEE}" srcId="{D23EB86A-71BB-4A40-A569-8B77FDBE02FA}" destId="{C1E12F4A-6EB8-4EF1-9A2E-60BEBFA81592}" srcOrd="1" destOrd="0" parTransId="{3839A656-D98B-47E9-A658-DF73304CEB18}" sibTransId="{22D1E09B-DC05-4745-B8F2-30FA2BC8B359}"/>
+    <dgm:cxn modelId="{61C9982F-CD29-461E-B7A2-844320B3320E}" type="presOf" srcId="{D29747DE-81BE-44CC-ADFA-D349E8B24264}" destId="{8C1715B6-BA7B-438E-97EB-8AEC5ECBF87A}" srcOrd="0" destOrd="0" presId="urn:microsoft.com/office/officeart/2005/8/layout/hierarchy3"/>
+    <dgm:cxn modelId="{C21777D7-7565-44BF-85F7-0C02E051AAA0}" type="presOf" srcId="{B66C6E76-A77D-4BAE-A190-E7C7B99630D5}" destId="{2D6695BE-25C1-46C7-8352-964F3DB123E4}" srcOrd="0" destOrd="0" presId="urn:microsoft.com/office/officeart/2005/8/layout/hierarchy3"/>
+    <dgm:cxn modelId="{B7DA8A26-DCF4-479F-8D62-54606673305A}" type="presOf" srcId="{3F425AB1-C509-4C12-835D-8FB48463C56E}" destId="{B128F964-9EE8-46FF-B519-C8284E2BB040}" srcOrd="0" destOrd="0" presId="urn:microsoft.com/office/officeart/2005/8/layout/hierarchy3"/>
+    <dgm:cxn modelId="{C63FD1B0-EEE3-4366-A02B-3EBF816D33FA}" srcId="{B66C6E76-A77D-4BAE-A190-E7C7B99630D5}" destId="{EFA38823-71A3-47C6-B0F4-1CB6C01186B4}" srcOrd="5" destOrd="0" parTransId="{6D2CB1FD-153F-413A-9094-97A8C82D1A59}" sibTransId="{F36243A3-0694-4470-B3FF-00EC19796C92}"/>
+    <dgm:cxn modelId="{9C9BE23E-6612-44C5-9CFE-9CC7832BF2A5}" srcId="{D23EB86A-71BB-4A40-A569-8B77FDBE02FA}" destId="{D29747DE-81BE-44CC-ADFA-D349E8B24264}" srcOrd="3" destOrd="0" parTransId="{DA8DF7CA-1898-479A-AB8B-30F622A20386}" sibTransId="{F71EDA71-5AF9-41DC-841C-C32CB38CA494}"/>
+    <dgm:cxn modelId="{5ECC07F0-D5CC-4968-A0C6-9C1D48CA3C36}" srcId="{2532EC49-0FBE-4774-B31A-BBBB468170F7}" destId="{D23EB86A-71BB-4A40-A569-8B77FDBE02FA}" srcOrd="0" destOrd="0" parTransId="{6D067A31-E2BD-456C-9D7E-4D8644E3311A}" sibTransId="{D4EEEF3F-A295-43A8-97BA-8D293266F8CC}"/>
+    <dgm:cxn modelId="{775362DD-7045-4F1C-AA3F-3062D1029467}" type="presOf" srcId="{D23EB86A-71BB-4A40-A569-8B77FDBE02FA}" destId="{A75A51E0-87EF-40A0-961A-12248580B45C}" srcOrd="1" destOrd="0" presId="urn:microsoft.com/office/officeart/2005/8/layout/hierarchy3"/>
+    <dgm:cxn modelId="{C6AEAA7A-BF9A-4195-B4A4-5F0A6B9FD8BF}" type="presOf" srcId="{6D187876-D73A-4DA0-8A96-0B77CF7C51D8}" destId="{548B7762-B5B8-4C69-88AE-F72473B32CBC}" srcOrd="0" destOrd="0" presId="urn:microsoft.com/office/officeart/2005/8/layout/hierarchy3"/>
+    <dgm:cxn modelId="{7D6FF0F7-548D-4CE5-8A7E-1EB8380B0229}" type="presOf" srcId="{C1E12F4A-6EB8-4EF1-9A2E-60BEBFA81592}" destId="{4BFBAF82-2A9D-4DC1-A988-0880718FA259}" srcOrd="0" destOrd="0" presId="urn:microsoft.com/office/officeart/2005/8/layout/hierarchy3"/>
+    <dgm:cxn modelId="{126129EF-FD55-4092-A572-7657075334A6}" type="presOf" srcId="{95D8C2BB-FFF3-4F61-8445-6BF1251A0DDC}" destId="{50E43E93-9EF6-4576-8695-D64977549991}" srcOrd="0" destOrd="0" presId="urn:microsoft.com/office/officeart/2005/8/layout/hierarchy3"/>
+    <dgm:cxn modelId="{AB861BCE-5919-4B0A-A9F5-9564E777362E}" type="presOf" srcId="{52572F2B-AAE6-4BE9-9BBD-CB4C6B7CD675}" destId="{A5E6D460-1049-4DD1-B5F1-BB5A03E46C6F}" srcOrd="0" destOrd="0" presId="urn:microsoft.com/office/officeart/2005/8/layout/hierarchy3"/>
+    <dgm:cxn modelId="{36B9DA8C-A689-4553-832D-61EB7B85622D}" srcId="{D23EB86A-71BB-4A40-A569-8B77FDBE02FA}" destId="{52572F2B-AAE6-4BE9-9BBD-CB4C6B7CD675}" srcOrd="6" destOrd="0" parTransId="{D28794C1-D31F-40DE-AE24-412233A7CACB}" sibTransId="{77A8EC62-DEC3-4292-ABC8-A6168E4C97F0}"/>
     <dgm:cxn modelId="{A2F9B0F4-AA78-4158-8B2E-635DF7ACED91}" type="presOf" srcId="{6D2CB1FD-153F-413A-9094-97A8C82D1A59}" destId="{42A4DB9D-6604-49D8-A581-EB7995E16BE9}" srcOrd="0" destOrd="0" presId="urn:microsoft.com/office/officeart/2005/8/layout/hierarchy3"/>
-    <dgm:cxn modelId="{A72944CA-EA98-4912-BD8E-D7A0B9B4AAED}" type="presOf" srcId="{E4BAB214-F282-46A9-895A-D9BD0E84DB3F}" destId="{5F110DA3-1DE8-4F12-A68F-86C4A5BF1E8C}" srcOrd="0" destOrd="0" presId="urn:microsoft.com/office/officeart/2005/8/layout/hierarchy3"/>
-    <dgm:cxn modelId="{E82A3251-91DA-4815-893B-2CB56E9913F8}" type="presOf" srcId="{37769943-29F6-4B68-A449-5DEE7577C941}" destId="{6CF04F40-20BC-4EE2-A8E0-91CE9C5F4FA8}" srcOrd="0" destOrd="0" presId="urn:microsoft.com/office/officeart/2005/8/layout/hierarchy3"/>
-    <dgm:cxn modelId="{C1C2960F-E59B-4440-A2DC-E6C8222CBDEE}" srcId="{D23EB86A-71BB-4A40-A569-8B77FDBE02FA}" destId="{C1E12F4A-6EB8-4EF1-9A2E-60BEBFA81592}" srcOrd="1" destOrd="0" parTransId="{3839A656-D98B-47E9-A658-DF73304CEB18}" sibTransId="{22D1E09B-DC05-4745-B8F2-30FA2BC8B359}"/>
-    <dgm:cxn modelId="{04D223AD-2624-412D-ADE6-DA2BEFC8FCB6}" type="presOf" srcId="{8BD967C0-A55D-48F9-95B1-733E8F50B17C}" destId="{0B3358E2-26D5-461E-AD31-7A4654034337}" srcOrd="0" destOrd="0" presId="urn:microsoft.com/office/officeart/2005/8/layout/hierarchy3"/>
-    <dgm:cxn modelId="{4FD3DC13-0721-431D-8738-4EDFC6E8A940}" type="presOf" srcId="{26EAFC01-7D93-44D6-B927-7C773411E24C}" destId="{0E7FBF3B-7D1F-4A68-8FFB-C953C781DE15}" srcOrd="0" destOrd="0" presId="urn:microsoft.com/office/officeart/2005/8/layout/hierarchy3"/>
-    <dgm:cxn modelId="{36B9DA8C-A689-4553-832D-61EB7B85622D}" srcId="{D23EB86A-71BB-4A40-A569-8B77FDBE02FA}" destId="{52572F2B-AAE6-4BE9-9BBD-CB4C6B7CD675}" srcOrd="6" destOrd="0" parTransId="{D28794C1-D31F-40DE-AE24-412233A7CACB}" sibTransId="{77A8EC62-DEC3-4292-ABC8-A6168E4C97F0}"/>
-    <dgm:cxn modelId="{7D6FF0F7-548D-4CE5-8A7E-1EB8380B0229}" type="presOf" srcId="{C1E12F4A-6EB8-4EF1-9A2E-60BEBFA81592}" destId="{4BFBAF82-2A9D-4DC1-A988-0880718FA259}" srcOrd="0" destOrd="0" presId="urn:microsoft.com/office/officeart/2005/8/layout/hierarchy3"/>
-    <dgm:cxn modelId="{E6C387B6-7931-4BB6-ABF0-EC9F8067348D}" type="presOf" srcId="{3839A656-D98B-47E9-A658-DF73304CEB18}" destId="{E91EC1B8-A184-48D1-9A69-E934B5C7B28A}" srcOrd="0" destOrd="0" presId="urn:microsoft.com/office/officeart/2005/8/layout/hierarchy3"/>
-    <dgm:cxn modelId="{4153DA9D-BE1A-43D1-84E0-B20DC04273A1}" type="presOf" srcId="{B66C6E76-A77D-4BAE-A190-E7C7B99630D5}" destId="{06CA16BD-3E66-4C53-92B0-52C52AD63648}" srcOrd="1" destOrd="0" presId="urn:microsoft.com/office/officeart/2005/8/layout/hierarchy3"/>
-    <dgm:cxn modelId="{6790B4E7-E0EE-41EB-945C-C376AB2B23D3}" type="presOf" srcId="{EFA38823-71A3-47C6-B0F4-1CB6C01186B4}" destId="{7FB5A010-9A56-4829-B858-D0D824AEF6AD}" srcOrd="0" destOrd="0" presId="urn:microsoft.com/office/officeart/2005/8/layout/hierarchy3"/>
-    <dgm:cxn modelId="{0B714DB5-1905-4C10-B2C3-52DE000CC7EE}" type="presOf" srcId="{2B7155C7-BEBA-47E6-A611-578103620110}" destId="{3548ED33-673B-47FB-8DF9-F219CFA710BC}" srcOrd="0" destOrd="0" presId="urn:microsoft.com/office/officeart/2005/8/layout/hierarchy3"/>
-    <dgm:cxn modelId="{4E9237CA-E46C-41CD-95BD-742F8950EEB9}" srcId="{B66C6E76-A77D-4BAE-A190-E7C7B99630D5}" destId="{95D8C2BB-FFF3-4F61-8445-6BF1251A0DDC}" srcOrd="3" destOrd="0" parTransId="{391C7100-F7CB-404F-9784-D4A0A18ED1F2}" sibTransId="{18C0857F-72C1-4B18-89F2-5D3B4F04A762}"/>
-    <dgm:cxn modelId="{B9A282EA-EB5D-4740-A114-7A5FDEC3F13F}" type="presOf" srcId="{1D5B013C-3814-4DBA-A114-793515C3A175}" destId="{36E41940-D6AE-4B61-9614-578943ADDEBE}" srcOrd="0" destOrd="0" presId="urn:microsoft.com/office/officeart/2005/8/layout/hierarchy3"/>
-    <dgm:cxn modelId="{0FFF8C14-2898-4723-981D-EC8EE61DB3B7}" type="presOf" srcId="{548E3DBA-F067-4E78-8538-35AFB2F1818B}" destId="{831964B1-E01A-4C78-9158-C8D63428B7DA}" srcOrd="0" destOrd="0" presId="urn:microsoft.com/office/officeart/2005/8/layout/hierarchy3"/>
-    <dgm:cxn modelId="{9C9BE23E-6612-44C5-9CFE-9CC7832BF2A5}" srcId="{D23EB86A-71BB-4A40-A569-8B77FDBE02FA}" destId="{D29747DE-81BE-44CC-ADFA-D349E8B24264}" srcOrd="3" destOrd="0" parTransId="{DA8DF7CA-1898-479A-AB8B-30F622A20386}" sibTransId="{F71EDA71-5AF9-41DC-841C-C32CB38CA494}"/>
-    <dgm:cxn modelId="{63DAAF5A-D4FF-4C0A-9DE7-FE4E42A34343}" srcId="{B66C6E76-A77D-4BAE-A190-E7C7B99630D5}" destId="{6D187876-D73A-4DA0-8A96-0B77CF7C51D8}" srcOrd="2" destOrd="0" parTransId="{E37E2F2F-CD39-482B-9878-0ED5657CF008}" sibTransId="{EE27B221-B777-430B-861D-692C62998E99}"/>
-    <dgm:cxn modelId="{0DAEDA3B-FE33-4B1C-9C27-E2E206218952}" srcId="{D23EB86A-71BB-4A40-A569-8B77FDBE02FA}" destId="{2B7155C7-BEBA-47E6-A611-578103620110}" srcOrd="4" destOrd="0" parTransId="{3F425AB1-C509-4C12-835D-8FB48463C56E}" sibTransId="{838E31E3-BBA0-4DFD-8508-33E3D64F2DF2}"/>
-    <dgm:cxn modelId="{126129EF-FD55-4092-A572-7657075334A6}" type="presOf" srcId="{95D8C2BB-FFF3-4F61-8445-6BF1251A0DDC}" destId="{50E43E93-9EF6-4576-8695-D64977549991}" srcOrd="0" destOrd="0" presId="urn:microsoft.com/office/officeart/2005/8/layout/hierarchy3"/>
-    <dgm:cxn modelId="{76A55E50-AF99-47A3-9455-AAFCB2256592}" srcId="{D23EB86A-71BB-4A40-A569-8B77FDBE02FA}" destId="{EE83A711-B233-4784-8790-B3D0B5AA4273}" srcOrd="2" destOrd="0" parTransId="{37769943-29F6-4B68-A449-5DEE7577C941}" sibTransId="{A43C7F0B-AC09-44C4-A7DC-DA92D0A575C5}"/>
-    <dgm:cxn modelId="{C63FD1B0-EEE3-4366-A02B-3EBF816D33FA}" srcId="{B66C6E76-A77D-4BAE-A190-E7C7B99630D5}" destId="{EFA38823-71A3-47C6-B0F4-1CB6C01186B4}" srcOrd="5" destOrd="0" parTransId="{6D2CB1FD-153F-413A-9094-97A8C82D1A59}" sibTransId="{F36243A3-0694-4470-B3FF-00EC19796C92}"/>
-    <dgm:cxn modelId="{4BA34B07-DA3A-4E4B-B5DC-913EF5747AE2}" type="presOf" srcId="{1317B38D-2A30-4107-9F27-1500BCF7FC6F}" destId="{4F01DEA1-6963-411C-B81A-F6998C0C045E}" srcOrd="0" destOrd="0" presId="urn:microsoft.com/office/officeart/2005/8/layout/hierarchy3"/>
-    <dgm:cxn modelId="{C765AA97-1366-4652-8C13-4650968F60CF}" type="presOf" srcId="{2532EC49-0FBE-4774-B31A-BBBB468170F7}" destId="{630F3D18-F2FD-492C-B34C-7F4ABA982010}" srcOrd="0" destOrd="0" presId="urn:microsoft.com/office/officeart/2005/8/layout/hierarchy3"/>
-    <dgm:cxn modelId="{9BEBC980-A36E-4C4A-A8DA-4CB6EEA808A1}" srcId="{D23EB86A-71BB-4A40-A569-8B77FDBE02FA}" destId="{548E3DBA-F067-4E78-8538-35AFB2F1818B}" srcOrd="5" destOrd="0" parTransId="{27188142-555D-4CE0-8FCC-5EF4E1AE4524}" sibTransId="{8FD1163F-C701-4469-B412-1D17C50819E9}"/>
-    <dgm:cxn modelId="{F989FA39-FD22-4920-A3AF-2C476F51F7CD}" type="presOf" srcId="{D28794C1-D31F-40DE-AE24-412233A7CACB}" destId="{CC93376A-112F-470C-A92E-6B9C4768A381}" srcOrd="0" destOrd="0" presId="urn:microsoft.com/office/officeart/2005/8/layout/hierarchy3"/>
-    <dgm:cxn modelId="{10F3401B-B541-4202-8EB4-FC6B333D53C3}" type="presOf" srcId="{7B27C1B8-5A68-42C8-A979-98E005722E76}" destId="{665B2015-8348-4619-A88A-458FE46C5216}" srcOrd="0" destOrd="0" presId="urn:microsoft.com/office/officeart/2005/8/layout/hierarchy3"/>
-    <dgm:cxn modelId="{61C9982F-CD29-461E-B7A2-844320B3320E}" type="presOf" srcId="{D29747DE-81BE-44CC-ADFA-D349E8B24264}" destId="{8C1715B6-BA7B-438E-97EB-8AEC5ECBF87A}" srcOrd="0" destOrd="0" presId="urn:microsoft.com/office/officeart/2005/8/layout/hierarchy3"/>
-    <dgm:cxn modelId="{AB861BCE-5919-4B0A-A9F5-9564E777362E}" type="presOf" srcId="{52572F2B-AAE6-4BE9-9BBD-CB4C6B7CD675}" destId="{A5E6D460-1049-4DD1-B5F1-BB5A03E46C6F}" srcOrd="0" destOrd="0" presId="urn:microsoft.com/office/officeart/2005/8/layout/hierarchy3"/>
-    <dgm:cxn modelId="{C21777D7-7565-44BF-85F7-0C02E051AAA0}" type="presOf" srcId="{B66C6E76-A77D-4BAE-A190-E7C7B99630D5}" destId="{2D6695BE-25C1-46C7-8352-964F3DB123E4}" srcOrd="0" destOrd="0" presId="urn:microsoft.com/office/officeart/2005/8/layout/hierarchy3"/>
-    <dgm:cxn modelId="{77917A58-C306-4CDB-9728-8CABB9E90F23}" srcId="{B66C6E76-A77D-4BAE-A190-E7C7B99630D5}" destId="{E4BAB214-F282-46A9-895A-D9BD0E84DB3F}" srcOrd="4" destOrd="0" parTransId="{1317B38D-2A30-4107-9F27-1500BCF7FC6F}" sibTransId="{DE121C5A-11BE-40E6-8198-0350C8D6F7E3}"/>
-    <dgm:cxn modelId="{775362DD-7045-4F1C-AA3F-3062D1029467}" type="presOf" srcId="{D23EB86A-71BB-4A40-A569-8B77FDBE02FA}" destId="{A75A51E0-87EF-40A0-961A-12248580B45C}" srcOrd="1" destOrd="0" presId="urn:microsoft.com/office/officeart/2005/8/layout/hierarchy3"/>
-    <dgm:cxn modelId="{DE2D8074-B02B-4163-ABB6-4E5E83ACBA7D}" srcId="{2532EC49-0FBE-4774-B31A-BBBB468170F7}" destId="{B66C6E76-A77D-4BAE-A190-E7C7B99630D5}" srcOrd="1" destOrd="0" parTransId="{B563D8E4-CC74-46B1-AD2F-0A19BF88D530}" sibTransId="{3A1A347E-7FA0-4BF5-BF25-0A9BF0BDF025}"/>
-    <dgm:cxn modelId="{C700B7A0-B850-465C-92CF-40C1B3CB7820}" srcId="{D23EB86A-71BB-4A40-A569-8B77FDBE02FA}" destId="{E37FFE57-7D3E-4712-B6FD-24123D60E026}" srcOrd="0" destOrd="0" parTransId="{1D5B013C-3814-4DBA-A114-793515C3A175}" sibTransId="{58BF5B3D-7E93-45F1-9609-42AD7A3F58C9}"/>
-    <dgm:cxn modelId="{AF1A09EC-49C6-4006-B436-7A9942329C9D}" type="presOf" srcId="{49F53E7A-EFE3-49C9-BF91-10D4091DFF4B}" destId="{6817C1B7-11FB-4758-B864-210D01678FDC}" srcOrd="0" destOrd="0" presId="urn:microsoft.com/office/officeart/2005/8/layout/hierarchy3"/>
-    <dgm:cxn modelId="{C6AEAA7A-BF9A-4195-B4A4-5F0A6B9FD8BF}" type="presOf" srcId="{6D187876-D73A-4DA0-8A96-0B77CF7C51D8}" destId="{548B7762-B5B8-4C69-88AE-F72473B32CBC}" srcOrd="0" destOrd="0" presId="urn:microsoft.com/office/officeart/2005/8/layout/hierarchy3"/>
-    <dgm:cxn modelId="{8DBEE0CF-9820-4CCB-9C43-3E263D8F0A78}" type="presOf" srcId="{27188142-555D-4CE0-8FCC-5EF4E1AE4524}" destId="{4A64C365-06C2-46B7-B947-59EF5BE39B6D}" srcOrd="0" destOrd="0" presId="urn:microsoft.com/office/officeart/2005/8/layout/hierarchy3"/>
-    <dgm:cxn modelId="{C93775F6-F432-4330-8A6D-42759A0EB22C}" srcId="{B66C6E76-A77D-4BAE-A190-E7C7B99630D5}" destId="{26EAFC01-7D93-44D6-B927-7C773411E24C}" srcOrd="1" destOrd="0" parTransId="{8BD967C0-A55D-48F9-95B1-733E8F50B17C}" sibTransId="{DDE37BE1-2D8B-4961-ACB4-7512244992A5}"/>
-    <dgm:cxn modelId="{8212B852-43EB-4FCB-93B4-34B834DF133D}" srcId="{B66C6E76-A77D-4BAE-A190-E7C7B99630D5}" destId="{49F53E7A-EFE3-49C9-BF91-10D4091DFF4B}" srcOrd="0" destOrd="0" parTransId="{7B27C1B8-5A68-42C8-A979-98E005722E76}" sibTransId="{A06AD473-1F5F-4C00-8E2A-03122FCC05B6}"/>
-    <dgm:cxn modelId="{8CE7A1E4-01AE-4101-A0D1-215458C22FFF}" type="presOf" srcId="{391C7100-F7CB-404F-9784-D4A0A18ED1F2}" destId="{D69BB881-E2F5-44B9-9DBD-6D90C7DB7496}" srcOrd="0" destOrd="0" presId="urn:microsoft.com/office/officeart/2005/8/layout/hierarchy3"/>
-    <dgm:cxn modelId="{3D0A4717-B8D7-4576-9FA5-10F0E5488DE9}" type="presOf" srcId="{D23EB86A-71BB-4A40-A569-8B77FDBE02FA}" destId="{72B13844-B30E-425B-9C7A-1663396A215A}" srcOrd="0" destOrd="0" presId="urn:microsoft.com/office/officeart/2005/8/layout/hierarchy3"/>
-    <dgm:cxn modelId="{B7DA8A26-DCF4-479F-8D62-54606673305A}" type="presOf" srcId="{3F425AB1-C509-4C12-835D-8FB48463C56E}" destId="{B128F964-9EE8-46FF-B519-C8284E2BB040}" srcOrd="0" destOrd="0" presId="urn:microsoft.com/office/officeart/2005/8/layout/hierarchy3"/>
-    <dgm:cxn modelId="{5ECC07F0-D5CC-4968-A0C6-9C1D48CA3C36}" srcId="{2532EC49-0FBE-4774-B31A-BBBB468170F7}" destId="{D23EB86A-71BB-4A40-A569-8B77FDBE02FA}" srcOrd="0" destOrd="0" parTransId="{6D067A31-E2BD-456C-9D7E-4D8644E3311A}" sibTransId="{D4EEEF3F-A295-43A8-97BA-8D293266F8CC}"/>
-    <dgm:cxn modelId="{1AF40643-3595-471D-A426-BD67B82D5BD6}" type="presOf" srcId="{E37FFE57-7D3E-4712-B6FD-24123D60E026}" destId="{62B5FB75-42A9-43BC-8FD2-7AB5067B12F7}" srcOrd="0" destOrd="0" presId="urn:microsoft.com/office/officeart/2005/8/layout/hierarchy3"/>
-    <dgm:cxn modelId="{C571757F-977E-42C8-9358-F310B414AE16}" type="presOf" srcId="{EE83A711-B233-4784-8790-B3D0B5AA4273}" destId="{7E81931F-3C81-4DB3-82D5-109D76282892}" srcOrd="0" destOrd="0" presId="urn:microsoft.com/office/officeart/2005/8/layout/hierarchy3"/>
-    <dgm:cxn modelId="{F3019377-656E-4845-BB8D-F38DE89FFE4F}" type="presOf" srcId="{E37E2F2F-CD39-482B-9878-0ED5657CF008}" destId="{2F157E92-6736-4A13-A6CB-BE96A53AFD9F}" srcOrd="0" destOrd="0" presId="urn:microsoft.com/office/officeart/2005/8/layout/hierarchy3"/>
     <dgm:cxn modelId="{0AA03739-D2AB-4404-B06F-16926BA2ADE5}" type="presParOf" srcId="{630F3D18-F2FD-492C-B34C-7F4ABA982010}" destId="{95A8F5A5-B508-4717-9764-313C12304A7F}" srcOrd="0" destOrd="0" presId="urn:microsoft.com/office/officeart/2005/8/layout/hierarchy3"/>
     <dgm:cxn modelId="{2D7F8ACA-CF27-4639-B557-8DA473DB66FB}" type="presParOf" srcId="{95A8F5A5-B508-4717-9764-313C12304A7F}" destId="{98AA41C0-3CF6-433B-B897-F1DC4F31436D}" srcOrd="0" destOrd="0" presId="urn:microsoft.com/office/officeart/2005/8/layout/hierarchy3"/>
     <dgm:cxn modelId="{372AD94D-EE9D-4370-889F-61BD7C880DE7}" type="presParOf" srcId="{98AA41C0-3CF6-433B-B897-F1DC4F31436D}" destId="{72B13844-B30E-425B-9C7A-1663396A215A}" srcOrd="0" destOrd="0" presId="urn:microsoft.com/office/officeart/2005/8/layout/hierarchy3"/>
@@ -2037,1986 +2037,6 @@
       <dsp:cNvGrpSpPr/>
     </dsp:nvGrpSpPr>
     <dsp:grpSpPr/>
-    <dsp:sp modelId="{72B13844-B30E-425B-9C7A-1663396A215A}">
-      <dsp:nvSpPr>
-        <dsp:cNvPr id="0" name=""/>
-        <dsp:cNvSpPr/>
-      </dsp:nvSpPr>
-      <dsp:spPr>
-        <a:xfrm>
-          <a:off x="1746298" y="3576"/>
-          <a:ext cx="1003750" cy="501875"/>
-        </a:xfrm>
-        <a:prstGeom prst="roundRect">
-          <a:avLst>
-            <a:gd name="adj" fmla="val 10000"/>
-          </a:avLst>
-        </a:prstGeom>
-        <a:gradFill rotWithShape="0">
-          <a:gsLst>
-            <a:gs pos="0">
-              <a:schemeClr val="accent1">
-                <a:hueOff val="0"/>
-                <a:satOff val="0"/>
-                <a:lumOff val="0"/>
-                <a:alphaOff val="0"/>
-                <a:tint val="98000"/>
-                <a:lumMod val="114000"/>
-              </a:schemeClr>
-            </a:gs>
-            <a:gs pos="100000">
-              <a:schemeClr val="accent1">
-                <a:hueOff val="0"/>
-                <a:satOff val="0"/>
-                <a:lumOff val="0"/>
-                <a:alphaOff val="0"/>
-                <a:shade val="90000"/>
-                <a:lumMod val="84000"/>
-              </a:schemeClr>
-            </a:gs>
-          </a:gsLst>
-          <a:lin ang="5400000" scaled="0"/>
-        </a:gradFill>
-        <a:ln>
-          <a:noFill/>
-        </a:ln>
-        <a:effectLst>
-          <a:outerShdw blurRad="38100" dist="25400" dir="5400000" rotWithShape="0">
-            <a:srgbClr val="000000">
-              <a:alpha val="45000"/>
-            </a:srgbClr>
-          </a:outerShdw>
-        </a:effectLst>
-      </dsp:spPr>
-      <dsp:style>
-        <a:lnRef idx="0">
-          <a:scrgbClr r="0" g="0" b="0"/>
-        </a:lnRef>
-        <a:fillRef idx="3">
-          <a:scrgbClr r="0" g="0" b="0"/>
-        </a:fillRef>
-        <a:effectRef idx="2">
-          <a:scrgbClr r="0" g="0" b="0"/>
-        </a:effectRef>
-        <a:fontRef idx="minor">
-          <a:schemeClr val="lt1"/>
-        </a:fontRef>
-      </dsp:style>
-      <dsp:txBody>
-        <a:bodyPr spcFirstLastPara="0" vert="horz" wrap="square" lIns="51435" tIns="34290" rIns="51435" bIns="34290" numCol="1" spcCol="1270" anchor="ctr" anchorCtr="0">
-          <a:noAutofit/>
-        </a:bodyPr>
-        <a:lstStyle/>
-        <a:p>
-          <a:pPr lvl="0" algn="ctr" defTabSz="1200150">
-            <a:lnSpc>
-              <a:spcPct val="90000"/>
-            </a:lnSpc>
-            <a:spcBef>
-              <a:spcPct val="0"/>
-            </a:spcBef>
-            <a:spcAft>
-              <a:spcPct val="35000"/>
-            </a:spcAft>
-          </a:pPr>
-          <a:r>
-            <a:rPr lang="pt-PT" sz="2700" kern="1200" dirty="0" smtClean="0"/>
-            <a:t>Pros</a:t>
-          </a:r>
-          <a:endParaRPr lang="pt-PT" sz="2700" kern="1200" dirty="0"/>
-        </a:p>
-      </dsp:txBody>
-      <dsp:txXfrm>
-        <a:off x="1760997" y="18275"/>
-        <a:ext cx="974352" cy="472477"/>
-      </dsp:txXfrm>
-    </dsp:sp>
-    <dsp:sp modelId="{36E41940-D6AE-4B61-9614-578943ADDEBE}">
-      <dsp:nvSpPr>
-        <dsp:cNvPr id="0" name=""/>
-        <dsp:cNvSpPr/>
-      </dsp:nvSpPr>
-      <dsp:spPr>
-        <a:xfrm>
-          <a:off x="1846673" y="505451"/>
-          <a:ext cx="100375" cy="322391"/>
-        </a:xfrm>
-        <a:custGeom>
-          <a:avLst/>
-          <a:gdLst/>
-          <a:ahLst/>
-          <a:cxnLst/>
-          <a:rect l="0" t="0" r="0" b="0"/>
-          <a:pathLst>
-            <a:path>
-              <a:moveTo>
-                <a:pt x="0" y="0"/>
-              </a:moveTo>
-              <a:lnTo>
-                <a:pt x="0" y="322391"/>
-              </a:lnTo>
-              <a:lnTo>
-                <a:pt x="100375" y="322391"/>
-              </a:lnTo>
-            </a:path>
-          </a:pathLst>
-        </a:custGeom>
-        <a:noFill/>
-        <a:ln w="9525" cap="rnd" cmpd="sng" algn="ctr">
-          <a:solidFill>
-            <a:schemeClr val="accent1">
-              <a:shade val="60000"/>
-              <a:hueOff val="0"/>
-              <a:satOff val="0"/>
-              <a:lumOff val="0"/>
-              <a:alphaOff val="0"/>
-            </a:schemeClr>
-          </a:solidFill>
-          <a:prstDash val="solid"/>
-        </a:ln>
-        <a:effectLst/>
-      </dsp:spPr>
-      <dsp:style>
-        <a:lnRef idx="1">
-          <a:scrgbClr r="0" g="0" b="0"/>
-        </a:lnRef>
-        <a:fillRef idx="0">
-          <a:scrgbClr r="0" g="0" b="0"/>
-        </a:fillRef>
-        <a:effectRef idx="0">
-          <a:scrgbClr r="0" g="0" b="0"/>
-        </a:effectRef>
-        <a:fontRef idx="minor"/>
-      </dsp:style>
-    </dsp:sp>
-    <dsp:sp modelId="{62B5FB75-42A9-43BC-8FD2-7AB5067B12F7}">
-      <dsp:nvSpPr>
-        <dsp:cNvPr id="0" name=""/>
-        <dsp:cNvSpPr/>
-      </dsp:nvSpPr>
-      <dsp:spPr>
-        <a:xfrm>
-          <a:off x="1947049" y="599717"/>
-          <a:ext cx="730000" cy="456250"/>
-        </a:xfrm>
-        <a:prstGeom prst="roundRect">
-          <a:avLst>
-            <a:gd name="adj" fmla="val 10000"/>
-          </a:avLst>
-        </a:prstGeom>
-        <a:solidFill>
-          <a:schemeClr val="lt1">
-            <a:alpha val="90000"/>
-            <a:hueOff val="0"/>
-            <a:satOff val="0"/>
-            <a:lumOff val="0"/>
-            <a:alphaOff val="0"/>
-          </a:schemeClr>
-        </a:solidFill>
-        <a:ln w="9525" cap="rnd" cmpd="sng" algn="ctr">
-          <a:solidFill>
-            <a:schemeClr val="accent1">
-              <a:hueOff val="0"/>
-              <a:satOff val="0"/>
-              <a:lumOff val="0"/>
-              <a:alphaOff val="0"/>
-            </a:schemeClr>
-          </a:solidFill>
-          <a:prstDash val="solid"/>
-        </a:ln>
-        <a:effectLst/>
-      </dsp:spPr>
-      <dsp:style>
-        <a:lnRef idx="1">
-          <a:scrgbClr r="0" g="0" b="0"/>
-        </a:lnRef>
-        <a:fillRef idx="1">
-          <a:scrgbClr r="0" g="0" b="0"/>
-        </a:fillRef>
-        <a:effectRef idx="0">
-          <a:scrgbClr r="0" g="0" b="0"/>
-        </a:effectRef>
-        <a:fontRef idx="minor"/>
-      </dsp:style>
-      <dsp:txBody>
-        <a:bodyPr spcFirstLastPara="0" vert="horz" wrap="square" lIns="15240" tIns="10160" rIns="15240" bIns="10160" numCol="1" spcCol="1270" anchor="ctr" anchorCtr="0">
-          <a:noAutofit/>
-        </a:bodyPr>
-        <a:lstStyle/>
-        <a:p>
-          <a:pPr lvl="0" algn="ctr" defTabSz="355600">
-            <a:lnSpc>
-              <a:spcPct val="90000"/>
-            </a:lnSpc>
-            <a:spcBef>
-              <a:spcPct val="0"/>
-            </a:spcBef>
-            <a:spcAft>
-              <a:spcPct val="35000"/>
-            </a:spcAft>
-          </a:pPr>
-          <a:r>
-            <a:rPr lang="pt-PT" sz="800" kern="1200" dirty="0" smtClean="0"/>
-            <a:t>Efficient</a:t>
-          </a:r>
-          <a:endParaRPr lang="pt-PT" sz="700" kern="1200" dirty="0"/>
-        </a:p>
-      </dsp:txBody>
-      <dsp:txXfrm>
-        <a:off x="1960412" y="613080"/>
-        <a:ext cx="703274" cy="429524"/>
-      </dsp:txXfrm>
-    </dsp:sp>
-    <dsp:sp modelId="{E91EC1B8-A184-48D1-9A69-E934B5C7B28A}">
-      <dsp:nvSpPr>
-        <dsp:cNvPr id="0" name=""/>
-        <dsp:cNvSpPr/>
-      </dsp:nvSpPr>
-      <dsp:spPr>
-        <a:xfrm>
-          <a:off x="1846673" y="505451"/>
-          <a:ext cx="100375" cy="872908"/>
-        </a:xfrm>
-        <a:custGeom>
-          <a:avLst/>
-          <a:gdLst/>
-          <a:ahLst/>
-          <a:cxnLst/>
-          <a:rect l="0" t="0" r="0" b="0"/>
-          <a:pathLst>
-            <a:path>
-              <a:moveTo>
-                <a:pt x="0" y="0"/>
-              </a:moveTo>
-              <a:lnTo>
-                <a:pt x="0" y="872908"/>
-              </a:lnTo>
-              <a:lnTo>
-                <a:pt x="100375" y="872908"/>
-              </a:lnTo>
-            </a:path>
-          </a:pathLst>
-        </a:custGeom>
-        <a:noFill/>
-        <a:ln w="9525" cap="rnd" cmpd="sng" algn="ctr">
-          <a:solidFill>
-            <a:schemeClr val="accent1">
-              <a:shade val="60000"/>
-              <a:hueOff val="0"/>
-              <a:satOff val="0"/>
-              <a:lumOff val="0"/>
-              <a:alphaOff val="0"/>
-            </a:schemeClr>
-          </a:solidFill>
-          <a:prstDash val="solid"/>
-        </a:ln>
-        <a:effectLst/>
-      </dsp:spPr>
-      <dsp:style>
-        <a:lnRef idx="1">
-          <a:scrgbClr r="0" g="0" b="0"/>
-        </a:lnRef>
-        <a:fillRef idx="0">
-          <a:scrgbClr r="0" g="0" b="0"/>
-        </a:fillRef>
-        <a:effectRef idx="0">
-          <a:scrgbClr r="0" g="0" b="0"/>
-        </a:effectRef>
-        <a:fontRef idx="minor"/>
-      </dsp:style>
-    </dsp:sp>
-    <dsp:sp modelId="{4BFBAF82-2A9D-4DC1-A988-0880718FA259}">
-      <dsp:nvSpPr>
-        <dsp:cNvPr id="0" name=""/>
-        <dsp:cNvSpPr/>
-      </dsp:nvSpPr>
-      <dsp:spPr>
-        <a:xfrm>
-          <a:off x="1947049" y="1150234"/>
-          <a:ext cx="730000" cy="456250"/>
-        </a:xfrm>
-        <a:prstGeom prst="roundRect">
-          <a:avLst>
-            <a:gd name="adj" fmla="val 10000"/>
-          </a:avLst>
-        </a:prstGeom>
-        <a:solidFill>
-          <a:schemeClr val="lt1">
-            <a:alpha val="90000"/>
-            <a:hueOff val="0"/>
-            <a:satOff val="0"/>
-            <a:lumOff val="0"/>
-            <a:alphaOff val="0"/>
-          </a:schemeClr>
-        </a:solidFill>
-        <a:ln w="9525" cap="rnd" cmpd="sng" algn="ctr">
-          <a:solidFill>
-            <a:schemeClr val="accent1">
-              <a:hueOff val="0"/>
-              <a:satOff val="0"/>
-              <a:lumOff val="0"/>
-              <a:alphaOff val="0"/>
-            </a:schemeClr>
-          </a:solidFill>
-          <a:prstDash val="solid"/>
-        </a:ln>
-        <a:effectLst/>
-      </dsp:spPr>
-      <dsp:style>
-        <a:lnRef idx="1">
-          <a:scrgbClr r="0" g="0" b="0"/>
-        </a:lnRef>
-        <a:fillRef idx="1">
-          <a:scrgbClr r="0" g="0" b="0"/>
-        </a:fillRef>
-        <a:effectRef idx="0">
-          <a:scrgbClr r="0" g="0" b="0"/>
-        </a:effectRef>
-        <a:fontRef idx="minor"/>
-      </dsp:style>
-      <dsp:txBody>
-        <a:bodyPr spcFirstLastPara="0" vert="horz" wrap="square" lIns="13335" tIns="8890" rIns="13335" bIns="8890" numCol="1" spcCol="1270" anchor="ctr" anchorCtr="0">
-          <a:noAutofit/>
-        </a:bodyPr>
-        <a:lstStyle/>
-        <a:p>
-          <a:pPr lvl="0" algn="ctr" defTabSz="311150">
-            <a:lnSpc>
-              <a:spcPct val="90000"/>
-            </a:lnSpc>
-            <a:spcBef>
-              <a:spcPct val="0"/>
-            </a:spcBef>
-            <a:spcAft>
-              <a:spcPct val="35000"/>
-            </a:spcAft>
-          </a:pPr>
-          <a:r>
-            <a:rPr lang="pt-PT" sz="700" kern="1200" dirty="0" smtClean="0"/>
-            <a:t>Automatic Build for each commit</a:t>
-          </a:r>
-          <a:endParaRPr lang="pt-PT" sz="700" kern="1200" dirty="0"/>
-        </a:p>
-      </dsp:txBody>
-      <dsp:txXfrm>
-        <a:off x="1960412" y="1163597"/>
-        <a:ext cx="703274" cy="429524"/>
-      </dsp:txXfrm>
-    </dsp:sp>
-    <dsp:sp modelId="{6CF04F40-20BC-4EE2-A8E0-91CE9C5F4FA8}">
-      <dsp:nvSpPr>
-        <dsp:cNvPr id="0" name=""/>
-        <dsp:cNvSpPr/>
-      </dsp:nvSpPr>
-      <dsp:spPr>
-        <a:xfrm>
-          <a:off x="1846673" y="505451"/>
-          <a:ext cx="100375" cy="1423425"/>
-        </a:xfrm>
-        <a:custGeom>
-          <a:avLst/>
-          <a:gdLst/>
-          <a:ahLst/>
-          <a:cxnLst/>
-          <a:rect l="0" t="0" r="0" b="0"/>
-          <a:pathLst>
-            <a:path>
-              <a:moveTo>
-                <a:pt x="0" y="0"/>
-              </a:moveTo>
-              <a:lnTo>
-                <a:pt x="0" y="1423425"/>
-              </a:lnTo>
-              <a:lnTo>
-                <a:pt x="100375" y="1423425"/>
-              </a:lnTo>
-            </a:path>
-          </a:pathLst>
-        </a:custGeom>
-        <a:noFill/>
-        <a:ln w="9525" cap="rnd" cmpd="sng" algn="ctr">
-          <a:solidFill>
-            <a:schemeClr val="accent1">
-              <a:shade val="60000"/>
-              <a:hueOff val="0"/>
-              <a:satOff val="0"/>
-              <a:lumOff val="0"/>
-              <a:alphaOff val="0"/>
-            </a:schemeClr>
-          </a:solidFill>
-          <a:prstDash val="solid"/>
-        </a:ln>
-        <a:effectLst/>
-      </dsp:spPr>
-      <dsp:style>
-        <a:lnRef idx="1">
-          <a:scrgbClr r="0" g="0" b="0"/>
-        </a:lnRef>
-        <a:fillRef idx="0">
-          <a:scrgbClr r="0" g="0" b="0"/>
-        </a:fillRef>
-        <a:effectRef idx="0">
-          <a:scrgbClr r="0" g="0" b="0"/>
-        </a:effectRef>
-        <a:fontRef idx="minor"/>
-      </dsp:style>
-    </dsp:sp>
-    <dsp:sp modelId="{7E81931F-3C81-4DB3-82D5-109D76282892}">
-      <dsp:nvSpPr>
-        <dsp:cNvPr id="0" name=""/>
-        <dsp:cNvSpPr/>
-      </dsp:nvSpPr>
-      <dsp:spPr>
-        <a:xfrm>
-          <a:off x="1947049" y="1700751"/>
-          <a:ext cx="730000" cy="456250"/>
-        </a:xfrm>
-        <a:prstGeom prst="roundRect">
-          <a:avLst>
-            <a:gd name="adj" fmla="val 10000"/>
-          </a:avLst>
-        </a:prstGeom>
-        <a:solidFill>
-          <a:schemeClr val="lt1">
-            <a:alpha val="90000"/>
-            <a:hueOff val="0"/>
-            <a:satOff val="0"/>
-            <a:lumOff val="0"/>
-            <a:alphaOff val="0"/>
-          </a:schemeClr>
-        </a:solidFill>
-        <a:ln w="9525" cap="rnd" cmpd="sng" algn="ctr">
-          <a:solidFill>
-            <a:schemeClr val="accent1">
-              <a:hueOff val="0"/>
-              <a:satOff val="0"/>
-              <a:lumOff val="0"/>
-              <a:alphaOff val="0"/>
-            </a:schemeClr>
-          </a:solidFill>
-          <a:prstDash val="solid"/>
-        </a:ln>
-        <a:effectLst/>
-      </dsp:spPr>
-      <dsp:style>
-        <a:lnRef idx="1">
-          <a:scrgbClr r="0" g="0" b="0"/>
-        </a:lnRef>
-        <a:fillRef idx="1">
-          <a:scrgbClr r="0" g="0" b="0"/>
-        </a:fillRef>
-        <a:effectRef idx="0">
-          <a:scrgbClr r="0" g="0" b="0"/>
-        </a:effectRef>
-        <a:fontRef idx="minor"/>
-      </dsp:style>
-      <dsp:txBody>
-        <a:bodyPr spcFirstLastPara="0" vert="horz" wrap="square" lIns="13335" tIns="8890" rIns="13335" bIns="8890" numCol="1" spcCol="1270" anchor="ctr" anchorCtr="0">
-          <a:noAutofit/>
-        </a:bodyPr>
-        <a:lstStyle/>
-        <a:p>
-          <a:pPr lvl="0" algn="ctr" defTabSz="311150">
-            <a:lnSpc>
-              <a:spcPct val="90000"/>
-            </a:lnSpc>
-            <a:spcBef>
-              <a:spcPct val="0"/>
-            </a:spcBef>
-            <a:spcAft>
-              <a:spcPct val="35000"/>
-            </a:spcAft>
-          </a:pPr>
-          <a:r>
-            <a:rPr lang="pt-PT" sz="700" kern="1200" dirty="0" smtClean="0"/>
-            <a:t>Open Source</a:t>
-          </a:r>
-          <a:endParaRPr lang="pt-PT" sz="700" kern="1200" dirty="0"/>
-        </a:p>
-      </dsp:txBody>
-      <dsp:txXfrm>
-        <a:off x="1960412" y="1714114"/>
-        <a:ext cx="703274" cy="429524"/>
-      </dsp:txXfrm>
-    </dsp:sp>
-    <dsp:sp modelId="{59F0254C-AFAD-4E3D-A8F7-6171D1D72BE5}">
-      <dsp:nvSpPr>
-        <dsp:cNvPr id="0" name=""/>
-        <dsp:cNvSpPr/>
-      </dsp:nvSpPr>
-      <dsp:spPr>
-        <a:xfrm>
-          <a:off x="1846673" y="505451"/>
-          <a:ext cx="100375" cy="1973942"/>
-        </a:xfrm>
-        <a:custGeom>
-          <a:avLst/>
-          <a:gdLst/>
-          <a:ahLst/>
-          <a:cxnLst/>
-          <a:rect l="0" t="0" r="0" b="0"/>
-          <a:pathLst>
-            <a:path>
-              <a:moveTo>
-                <a:pt x="0" y="0"/>
-              </a:moveTo>
-              <a:lnTo>
-                <a:pt x="0" y="1973942"/>
-              </a:lnTo>
-              <a:lnTo>
-                <a:pt x="100375" y="1973942"/>
-              </a:lnTo>
-            </a:path>
-          </a:pathLst>
-        </a:custGeom>
-        <a:noFill/>
-        <a:ln w="9525" cap="rnd" cmpd="sng" algn="ctr">
-          <a:solidFill>
-            <a:schemeClr val="accent1">
-              <a:shade val="60000"/>
-              <a:hueOff val="0"/>
-              <a:satOff val="0"/>
-              <a:lumOff val="0"/>
-              <a:alphaOff val="0"/>
-            </a:schemeClr>
-          </a:solidFill>
-          <a:prstDash val="solid"/>
-        </a:ln>
-        <a:effectLst/>
-      </dsp:spPr>
-      <dsp:style>
-        <a:lnRef idx="1">
-          <a:scrgbClr r="0" g="0" b="0"/>
-        </a:lnRef>
-        <a:fillRef idx="0">
-          <a:scrgbClr r="0" g="0" b="0"/>
-        </a:fillRef>
-        <a:effectRef idx="0">
-          <a:scrgbClr r="0" g="0" b="0"/>
-        </a:effectRef>
-        <a:fontRef idx="minor"/>
-      </dsp:style>
-    </dsp:sp>
-    <dsp:sp modelId="{8C1715B6-BA7B-438E-97EB-8AEC5ECBF87A}">
-      <dsp:nvSpPr>
-        <dsp:cNvPr id="0" name=""/>
-        <dsp:cNvSpPr/>
-      </dsp:nvSpPr>
-      <dsp:spPr>
-        <a:xfrm>
-          <a:off x="1947049" y="2251268"/>
-          <a:ext cx="730000" cy="456250"/>
-        </a:xfrm>
-        <a:prstGeom prst="roundRect">
-          <a:avLst>
-            <a:gd name="adj" fmla="val 10000"/>
-          </a:avLst>
-        </a:prstGeom>
-        <a:solidFill>
-          <a:schemeClr val="lt1">
-            <a:alpha val="90000"/>
-            <a:hueOff val="0"/>
-            <a:satOff val="0"/>
-            <a:lumOff val="0"/>
-            <a:alphaOff val="0"/>
-          </a:schemeClr>
-        </a:solidFill>
-        <a:ln w="9525" cap="rnd" cmpd="sng" algn="ctr">
-          <a:solidFill>
-            <a:schemeClr val="accent1">
-              <a:hueOff val="0"/>
-              <a:satOff val="0"/>
-              <a:lumOff val="0"/>
-              <a:alphaOff val="0"/>
-            </a:schemeClr>
-          </a:solidFill>
-          <a:prstDash val="solid"/>
-        </a:ln>
-        <a:effectLst/>
-      </dsp:spPr>
-      <dsp:style>
-        <a:lnRef idx="1">
-          <a:scrgbClr r="0" g="0" b="0"/>
-        </a:lnRef>
-        <a:fillRef idx="1">
-          <a:scrgbClr r="0" g="0" b="0"/>
-        </a:fillRef>
-        <a:effectRef idx="0">
-          <a:scrgbClr r="0" g="0" b="0"/>
-        </a:effectRef>
-        <a:fontRef idx="minor"/>
-      </dsp:style>
-      <dsp:txBody>
-        <a:bodyPr spcFirstLastPara="0" vert="horz" wrap="square" lIns="13335" tIns="8890" rIns="13335" bIns="8890" numCol="1" spcCol="1270" anchor="ctr" anchorCtr="0">
-          <a:noAutofit/>
-        </a:bodyPr>
-        <a:lstStyle/>
-        <a:p>
-          <a:pPr lvl="0" algn="ctr" defTabSz="311150">
-            <a:lnSpc>
-              <a:spcPct val="90000"/>
-            </a:lnSpc>
-            <a:spcBef>
-              <a:spcPct val="0"/>
-            </a:spcBef>
-            <a:spcAft>
-              <a:spcPct val="35000"/>
-            </a:spcAft>
-          </a:pPr>
-          <a:r>
-            <a:rPr lang="pt-PT" sz="700" kern="1200" smtClean="0"/>
-            <a:t>Several </a:t>
-          </a:r>
-          <a:r>
-            <a:rPr lang="pt-PT" sz="700" kern="1200" dirty="0" smtClean="0"/>
-            <a:t>plugins</a:t>
-          </a:r>
-          <a:endParaRPr lang="pt-PT" sz="700" kern="1200" dirty="0"/>
-        </a:p>
-      </dsp:txBody>
-      <dsp:txXfrm>
-        <a:off x="1960412" y="2264631"/>
-        <a:ext cx="703274" cy="429524"/>
-      </dsp:txXfrm>
-    </dsp:sp>
-    <dsp:sp modelId="{B128F964-9EE8-46FF-B519-C8284E2BB040}">
-      <dsp:nvSpPr>
-        <dsp:cNvPr id="0" name=""/>
-        <dsp:cNvSpPr/>
-      </dsp:nvSpPr>
-      <dsp:spPr>
-        <a:xfrm>
-          <a:off x="1846673" y="505451"/>
-          <a:ext cx="100375" cy="2524458"/>
-        </a:xfrm>
-        <a:custGeom>
-          <a:avLst/>
-          <a:gdLst/>
-          <a:ahLst/>
-          <a:cxnLst/>
-          <a:rect l="0" t="0" r="0" b="0"/>
-          <a:pathLst>
-            <a:path>
-              <a:moveTo>
-                <a:pt x="0" y="0"/>
-              </a:moveTo>
-              <a:lnTo>
-                <a:pt x="0" y="2524458"/>
-              </a:lnTo>
-              <a:lnTo>
-                <a:pt x="100375" y="2524458"/>
-              </a:lnTo>
-            </a:path>
-          </a:pathLst>
-        </a:custGeom>
-        <a:noFill/>
-        <a:ln w="9525" cap="rnd" cmpd="sng" algn="ctr">
-          <a:solidFill>
-            <a:schemeClr val="accent1">
-              <a:shade val="60000"/>
-              <a:hueOff val="0"/>
-              <a:satOff val="0"/>
-              <a:lumOff val="0"/>
-              <a:alphaOff val="0"/>
-            </a:schemeClr>
-          </a:solidFill>
-          <a:prstDash val="solid"/>
-        </a:ln>
-        <a:effectLst/>
-      </dsp:spPr>
-      <dsp:style>
-        <a:lnRef idx="1">
-          <a:scrgbClr r="0" g="0" b="0"/>
-        </a:lnRef>
-        <a:fillRef idx="0">
-          <a:scrgbClr r="0" g="0" b="0"/>
-        </a:fillRef>
-        <a:effectRef idx="0">
-          <a:scrgbClr r="0" g="0" b="0"/>
-        </a:effectRef>
-        <a:fontRef idx="minor"/>
-      </dsp:style>
-    </dsp:sp>
-    <dsp:sp modelId="{3548ED33-673B-47FB-8DF9-F219CFA710BC}">
-      <dsp:nvSpPr>
-        <dsp:cNvPr id="0" name=""/>
-        <dsp:cNvSpPr/>
-      </dsp:nvSpPr>
-      <dsp:spPr>
-        <a:xfrm>
-          <a:off x="1947049" y="2801785"/>
-          <a:ext cx="730000" cy="456250"/>
-        </a:xfrm>
-        <a:prstGeom prst="roundRect">
-          <a:avLst>
-            <a:gd name="adj" fmla="val 10000"/>
-          </a:avLst>
-        </a:prstGeom>
-        <a:solidFill>
-          <a:schemeClr val="lt1">
-            <a:alpha val="90000"/>
-            <a:hueOff val="0"/>
-            <a:satOff val="0"/>
-            <a:lumOff val="0"/>
-            <a:alphaOff val="0"/>
-          </a:schemeClr>
-        </a:solidFill>
-        <a:ln w="9525" cap="rnd" cmpd="sng" algn="ctr">
-          <a:solidFill>
-            <a:schemeClr val="accent1">
-              <a:hueOff val="0"/>
-              <a:satOff val="0"/>
-              <a:lumOff val="0"/>
-              <a:alphaOff val="0"/>
-            </a:schemeClr>
-          </a:solidFill>
-          <a:prstDash val="solid"/>
-        </a:ln>
-        <a:effectLst/>
-      </dsp:spPr>
-      <dsp:style>
-        <a:lnRef idx="1">
-          <a:scrgbClr r="0" g="0" b="0"/>
-        </a:lnRef>
-        <a:fillRef idx="1">
-          <a:scrgbClr r="0" g="0" b="0"/>
-        </a:fillRef>
-        <a:effectRef idx="0">
-          <a:scrgbClr r="0" g="0" b="0"/>
-        </a:effectRef>
-        <a:fontRef idx="minor"/>
-      </dsp:style>
-      <dsp:txBody>
-        <a:bodyPr spcFirstLastPara="0" vert="horz" wrap="square" lIns="13335" tIns="8890" rIns="13335" bIns="8890" numCol="1" spcCol="1270" anchor="ctr" anchorCtr="0">
-          <a:noAutofit/>
-        </a:bodyPr>
-        <a:lstStyle/>
-        <a:p>
-          <a:pPr lvl="0" algn="ctr" defTabSz="311150">
-            <a:lnSpc>
-              <a:spcPct val="90000"/>
-            </a:lnSpc>
-            <a:spcBef>
-              <a:spcPct val="0"/>
-            </a:spcBef>
-            <a:spcAft>
-              <a:spcPct val="35000"/>
-            </a:spcAft>
-          </a:pPr>
-          <a:r>
-            <a:rPr lang="pt-PT" sz="700" kern="1200" dirty="0" smtClean="0"/>
-            <a:t>Constant conscient if build is “broken”</a:t>
-          </a:r>
-          <a:endParaRPr lang="pt-PT" sz="700" kern="1200" dirty="0"/>
-        </a:p>
-      </dsp:txBody>
-      <dsp:txXfrm>
-        <a:off x="1960412" y="2815148"/>
-        <a:ext cx="703274" cy="429524"/>
-      </dsp:txXfrm>
-    </dsp:sp>
-    <dsp:sp modelId="{4A64C365-06C2-46B7-B947-59EF5BE39B6D}">
-      <dsp:nvSpPr>
-        <dsp:cNvPr id="0" name=""/>
-        <dsp:cNvSpPr/>
-      </dsp:nvSpPr>
-      <dsp:spPr>
-        <a:xfrm>
-          <a:off x="1846673" y="505451"/>
-          <a:ext cx="100375" cy="3074975"/>
-        </a:xfrm>
-        <a:custGeom>
-          <a:avLst/>
-          <a:gdLst/>
-          <a:ahLst/>
-          <a:cxnLst/>
-          <a:rect l="0" t="0" r="0" b="0"/>
-          <a:pathLst>
-            <a:path>
-              <a:moveTo>
-                <a:pt x="0" y="0"/>
-              </a:moveTo>
-              <a:lnTo>
-                <a:pt x="0" y="3074975"/>
-              </a:lnTo>
-              <a:lnTo>
-                <a:pt x="100375" y="3074975"/>
-              </a:lnTo>
-            </a:path>
-          </a:pathLst>
-        </a:custGeom>
-        <a:noFill/>
-        <a:ln w="9525" cap="rnd" cmpd="sng" algn="ctr">
-          <a:solidFill>
-            <a:schemeClr val="accent1">
-              <a:shade val="60000"/>
-              <a:hueOff val="0"/>
-              <a:satOff val="0"/>
-              <a:lumOff val="0"/>
-              <a:alphaOff val="0"/>
-            </a:schemeClr>
-          </a:solidFill>
-          <a:prstDash val="solid"/>
-        </a:ln>
-        <a:effectLst/>
-      </dsp:spPr>
-      <dsp:style>
-        <a:lnRef idx="1">
-          <a:scrgbClr r="0" g="0" b="0"/>
-        </a:lnRef>
-        <a:fillRef idx="0">
-          <a:scrgbClr r="0" g="0" b="0"/>
-        </a:fillRef>
-        <a:effectRef idx="0">
-          <a:scrgbClr r="0" g="0" b="0"/>
-        </a:effectRef>
-        <a:fontRef idx="minor"/>
-      </dsp:style>
-    </dsp:sp>
-    <dsp:sp modelId="{831964B1-E01A-4C78-9158-C8D63428B7DA}">
-      <dsp:nvSpPr>
-        <dsp:cNvPr id="0" name=""/>
-        <dsp:cNvSpPr/>
-      </dsp:nvSpPr>
-      <dsp:spPr>
-        <a:xfrm>
-          <a:off x="1947049" y="3352301"/>
-          <a:ext cx="730000" cy="456250"/>
-        </a:xfrm>
-        <a:prstGeom prst="roundRect">
-          <a:avLst>
-            <a:gd name="adj" fmla="val 10000"/>
-          </a:avLst>
-        </a:prstGeom>
-        <a:solidFill>
-          <a:schemeClr val="lt1">
-            <a:alpha val="90000"/>
-            <a:hueOff val="0"/>
-            <a:satOff val="0"/>
-            <a:lumOff val="0"/>
-            <a:alphaOff val="0"/>
-          </a:schemeClr>
-        </a:solidFill>
-        <a:ln w="9525" cap="rnd" cmpd="sng" algn="ctr">
-          <a:solidFill>
-            <a:schemeClr val="accent1">
-              <a:hueOff val="0"/>
-              <a:satOff val="0"/>
-              <a:lumOff val="0"/>
-              <a:alphaOff val="0"/>
-            </a:schemeClr>
-          </a:solidFill>
-          <a:prstDash val="solid"/>
-        </a:ln>
-        <a:effectLst/>
-      </dsp:spPr>
-      <dsp:style>
-        <a:lnRef idx="1">
-          <a:scrgbClr r="0" g="0" b="0"/>
-        </a:lnRef>
-        <a:fillRef idx="1">
-          <a:scrgbClr r="0" g="0" b="0"/>
-        </a:fillRef>
-        <a:effectRef idx="0">
-          <a:scrgbClr r="0" g="0" b="0"/>
-        </a:effectRef>
-        <a:fontRef idx="minor"/>
-      </dsp:style>
-      <dsp:txBody>
-        <a:bodyPr spcFirstLastPara="0" vert="horz" wrap="square" lIns="13335" tIns="8890" rIns="13335" bIns="8890" numCol="1" spcCol="1270" anchor="ctr" anchorCtr="0">
-          <a:noAutofit/>
-        </a:bodyPr>
-        <a:lstStyle/>
-        <a:p>
-          <a:pPr lvl="0" algn="ctr" defTabSz="311150">
-            <a:lnSpc>
-              <a:spcPct val="90000"/>
-            </a:lnSpc>
-            <a:spcBef>
-              <a:spcPct val="0"/>
-            </a:spcBef>
-            <a:spcAft>
-              <a:spcPct val="35000"/>
-            </a:spcAft>
-          </a:pPr>
-          <a:r>
-            <a:rPr lang="pt-PT" sz="700" kern="1200" dirty="0" smtClean="0"/>
-            <a:t>A static code verfication can also be done</a:t>
-          </a:r>
-          <a:endParaRPr lang="pt-PT" sz="700" kern="1200" dirty="0"/>
-        </a:p>
-      </dsp:txBody>
-      <dsp:txXfrm>
-        <a:off x="1960412" y="3365664"/>
-        <a:ext cx="703274" cy="429524"/>
-      </dsp:txXfrm>
-    </dsp:sp>
-    <dsp:sp modelId="{CC93376A-112F-470C-A92E-6B9C4768A381}">
-      <dsp:nvSpPr>
-        <dsp:cNvPr id="0" name=""/>
-        <dsp:cNvSpPr/>
-      </dsp:nvSpPr>
-      <dsp:spPr>
-        <a:xfrm>
-          <a:off x="1846673" y="505451"/>
-          <a:ext cx="100375" cy="3625492"/>
-        </a:xfrm>
-        <a:custGeom>
-          <a:avLst/>
-          <a:gdLst/>
-          <a:ahLst/>
-          <a:cxnLst/>
-          <a:rect l="0" t="0" r="0" b="0"/>
-          <a:pathLst>
-            <a:path>
-              <a:moveTo>
-                <a:pt x="0" y="0"/>
-              </a:moveTo>
-              <a:lnTo>
-                <a:pt x="0" y="3625492"/>
-              </a:lnTo>
-              <a:lnTo>
-                <a:pt x="100375" y="3625492"/>
-              </a:lnTo>
-            </a:path>
-          </a:pathLst>
-        </a:custGeom>
-        <a:noFill/>
-        <a:ln w="9525" cap="rnd" cmpd="sng" algn="ctr">
-          <a:solidFill>
-            <a:schemeClr val="accent1">
-              <a:shade val="60000"/>
-              <a:hueOff val="0"/>
-              <a:satOff val="0"/>
-              <a:lumOff val="0"/>
-              <a:alphaOff val="0"/>
-            </a:schemeClr>
-          </a:solidFill>
-          <a:prstDash val="solid"/>
-        </a:ln>
-        <a:effectLst/>
-      </dsp:spPr>
-      <dsp:style>
-        <a:lnRef idx="1">
-          <a:scrgbClr r="0" g="0" b="0"/>
-        </a:lnRef>
-        <a:fillRef idx="0">
-          <a:scrgbClr r="0" g="0" b="0"/>
-        </a:fillRef>
-        <a:effectRef idx="0">
-          <a:scrgbClr r="0" g="0" b="0"/>
-        </a:effectRef>
-        <a:fontRef idx="minor"/>
-      </dsp:style>
-    </dsp:sp>
-    <dsp:sp modelId="{A5E6D460-1049-4DD1-B5F1-BB5A03E46C6F}">
-      <dsp:nvSpPr>
-        <dsp:cNvPr id="0" name=""/>
-        <dsp:cNvSpPr/>
-      </dsp:nvSpPr>
-      <dsp:spPr>
-        <a:xfrm>
-          <a:off x="1947049" y="3902818"/>
-          <a:ext cx="730000" cy="456250"/>
-        </a:xfrm>
-        <a:prstGeom prst="roundRect">
-          <a:avLst>
-            <a:gd name="adj" fmla="val 10000"/>
-          </a:avLst>
-        </a:prstGeom>
-        <a:solidFill>
-          <a:schemeClr val="lt1">
-            <a:alpha val="90000"/>
-            <a:hueOff val="0"/>
-            <a:satOff val="0"/>
-            <a:lumOff val="0"/>
-            <a:alphaOff val="0"/>
-          </a:schemeClr>
-        </a:solidFill>
-        <a:ln w="9525" cap="rnd" cmpd="sng" algn="ctr">
-          <a:solidFill>
-            <a:schemeClr val="accent1">
-              <a:hueOff val="0"/>
-              <a:satOff val="0"/>
-              <a:lumOff val="0"/>
-              <a:alphaOff val="0"/>
-            </a:schemeClr>
-          </a:solidFill>
-          <a:prstDash val="solid"/>
-        </a:ln>
-        <a:effectLst/>
-      </dsp:spPr>
-      <dsp:style>
-        <a:lnRef idx="1">
-          <a:scrgbClr r="0" g="0" b="0"/>
-        </a:lnRef>
-        <a:fillRef idx="1">
-          <a:scrgbClr r="0" g="0" b="0"/>
-        </a:fillRef>
-        <a:effectRef idx="0">
-          <a:scrgbClr r="0" g="0" b="0"/>
-        </a:effectRef>
-        <a:fontRef idx="minor"/>
-      </dsp:style>
-      <dsp:txBody>
-        <a:bodyPr spcFirstLastPara="0" vert="horz" wrap="square" lIns="13335" tIns="8890" rIns="13335" bIns="8890" numCol="1" spcCol="1270" anchor="ctr" anchorCtr="0">
-          <a:noAutofit/>
-        </a:bodyPr>
-        <a:lstStyle/>
-        <a:p>
-          <a:pPr lvl="0" algn="ctr" defTabSz="311150">
-            <a:lnSpc>
-              <a:spcPct val="90000"/>
-            </a:lnSpc>
-            <a:spcBef>
-              <a:spcPct val="0"/>
-            </a:spcBef>
-            <a:spcAft>
-              <a:spcPct val="35000"/>
-            </a:spcAft>
-          </a:pPr>
-          <a:r>
-            <a:rPr lang="pt-PT" sz="700" kern="1200" dirty="0" smtClean="0"/>
-            <a:t>Possibility to do “nightly builds” – </a:t>
-          </a:r>
-          <a:r>
-            <a:rPr lang="pt-PT" sz="700" kern="1200" dirty="0" err="1" smtClean="0"/>
-            <a:t>good</a:t>
-          </a:r>
-          <a:r>
-            <a:rPr lang="pt-PT" sz="700" kern="1200" dirty="0" smtClean="0"/>
-            <a:t> for big projects</a:t>
-          </a:r>
-          <a:endParaRPr lang="pt-PT" sz="700" kern="1200" dirty="0"/>
-        </a:p>
-      </dsp:txBody>
-      <dsp:txXfrm>
-        <a:off x="1960412" y="3916181"/>
-        <a:ext cx="703274" cy="429524"/>
-      </dsp:txXfrm>
-    </dsp:sp>
-    <dsp:sp modelId="{2D6695BE-25C1-46C7-8352-964F3DB123E4}">
-      <dsp:nvSpPr>
-        <dsp:cNvPr id="0" name=""/>
-        <dsp:cNvSpPr/>
-      </dsp:nvSpPr>
-      <dsp:spPr>
-        <a:xfrm>
-          <a:off x="2938582" y="3576"/>
-          <a:ext cx="1003750" cy="501875"/>
-        </a:xfrm>
-        <a:prstGeom prst="roundRect">
-          <a:avLst>
-            <a:gd name="adj" fmla="val 10000"/>
-          </a:avLst>
-        </a:prstGeom>
-        <a:gradFill rotWithShape="0">
-          <a:gsLst>
-            <a:gs pos="0">
-              <a:schemeClr val="accent1">
-                <a:hueOff val="0"/>
-                <a:satOff val="0"/>
-                <a:lumOff val="0"/>
-                <a:alphaOff val="0"/>
-                <a:tint val="98000"/>
-                <a:lumMod val="114000"/>
-              </a:schemeClr>
-            </a:gs>
-            <a:gs pos="100000">
-              <a:schemeClr val="accent1">
-                <a:hueOff val="0"/>
-                <a:satOff val="0"/>
-                <a:lumOff val="0"/>
-                <a:alphaOff val="0"/>
-                <a:shade val="90000"/>
-                <a:lumMod val="84000"/>
-              </a:schemeClr>
-            </a:gs>
-          </a:gsLst>
-          <a:lin ang="5400000" scaled="0"/>
-        </a:gradFill>
-        <a:ln>
-          <a:noFill/>
-        </a:ln>
-        <a:effectLst>
-          <a:outerShdw blurRad="38100" dist="25400" dir="5400000" rotWithShape="0">
-            <a:srgbClr val="000000">
-              <a:alpha val="45000"/>
-            </a:srgbClr>
-          </a:outerShdw>
-        </a:effectLst>
-      </dsp:spPr>
-      <dsp:style>
-        <a:lnRef idx="0">
-          <a:scrgbClr r="0" g="0" b="0"/>
-        </a:lnRef>
-        <a:fillRef idx="3">
-          <a:scrgbClr r="0" g="0" b="0"/>
-        </a:fillRef>
-        <a:effectRef idx="2">
-          <a:scrgbClr r="0" g="0" b="0"/>
-        </a:effectRef>
-        <a:fontRef idx="minor">
-          <a:schemeClr val="lt1"/>
-        </a:fontRef>
-      </dsp:style>
-      <dsp:txBody>
-        <a:bodyPr spcFirstLastPara="0" vert="horz" wrap="square" lIns="51435" tIns="34290" rIns="51435" bIns="34290" numCol="1" spcCol="1270" anchor="ctr" anchorCtr="0">
-          <a:noAutofit/>
-        </a:bodyPr>
-        <a:lstStyle/>
-        <a:p>
-          <a:pPr lvl="0" algn="ctr" defTabSz="1200150">
-            <a:lnSpc>
-              <a:spcPct val="90000"/>
-            </a:lnSpc>
-            <a:spcBef>
-              <a:spcPct val="0"/>
-            </a:spcBef>
-            <a:spcAft>
-              <a:spcPct val="35000"/>
-            </a:spcAft>
-          </a:pPr>
-          <a:r>
-            <a:rPr lang="pt-PT" sz="2700" kern="1200" dirty="0" smtClean="0"/>
-            <a:t>Cons</a:t>
-          </a:r>
-          <a:endParaRPr lang="pt-PT" sz="2700" kern="1200" dirty="0"/>
-        </a:p>
-      </dsp:txBody>
-      <dsp:txXfrm>
-        <a:off x="2953281" y="18275"/>
-        <a:ext cx="974352" cy="472477"/>
-      </dsp:txXfrm>
-    </dsp:sp>
-    <dsp:sp modelId="{665B2015-8348-4619-A88A-458FE46C5216}">
-      <dsp:nvSpPr>
-        <dsp:cNvPr id="0" name=""/>
-        <dsp:cNvSpPr/>
-      </dsp:nvSpPr>
-      <dsp:spPr>
-        <a:xfrm>
-          <a:off x="3038957" y="505451"/>
-          <a:ext cx="100375" cy="322391"/>
-        </a:xfrm>
-        <a:custGeom>
-          <a:avLst/>
-          <a:gdLst/>
-          <a:ahLst/>
-          <a:cxnLst/>
-          <a:rect l="0" t="0" r="0" b="0"/>
-          <a:pathLst>
-            <a:path>
-              <a:moveTo>
-                <a:pt x="0" y="0"/>
-              </a:moveTo>
-              <a:lnTo>
-                <a:pt x="0" y="322391"/>
-              </a:lnTo>
-              <a:lnTo>
-                <a:pt x="100375" y="322391"/>
-              </a:lnTo>
-            </a:path>
-          </a:pathLst>
-        </a:custGeom>
-        <a:noFill/>
-        <a:ln w="9525" cap="rnd" cmpd="sng" algn="ctr">
-          <a:solidFill>
-            <a:schemeClr val="accent1">
-              <a:shade val="60000"/>
-              <a:hueOff val="0"/>
-              <a:satOff val="0"/>
-              <a:lumOff val="0"/>
-              <a:alphaOff val="0"/>
-            </a:schemeClr>
-          </a:solidFill>
-          <a:prstDash val="solid"/>
-        </a:ln>
-        <a:effectLst/>
-      </dsp:spPr>
-      <dsp:style>
-        <a:lnRef idx="1">
-          <a:scrgbClr r="0" g="0" b="0"/>
-        </a:lnRef>
-        <a:fillRef idx="0">
-          <a:scrgbClr r="0" g="0" b="0"/>
-        </a:fillRef>
-        <a:effectRef idx="0">
-          <a:scrgbClr r="0" g="0" b="0"/>
-        </a:effectRef>
-        <a:fontRef idx="minor"/>
-      </dsp:style>
-    </dsp:sp>
-    <dsp:sp modelId="{6817C1B7-11FB-4758-B864-210D01678FDC}">
-      <dsp:nvSpPr>
-        <dsp:cNvPr id="0" name=""/>
-        <dsp:cNvSpPr/>
-      </dsp:nvSpPr>
-      <dsp:spPr>
-        <a:xfrm>
-          <a:off x="3139332" y="599717"/>
-          <a:ext cx="730000" cy="456250"/>
-        </a:xfrm>
-        <a:prstGeom prst="roundRect">
-          <a:avLst>
-            <a:gd name="adj" fmla="val 10000"/>
-          </a:avLst>
-        </a:prstGeom>
-        <a:solidFill>
-          <a:schemeClr val="lt1">
-            <a:alpha val="90000"/>
-            <a:hueOff val="0"/>
-            <a:satOff val="0"/>
-            <a:lumOff val="0"/>
-            <a:alphaOff val="0"/>
-          </a:schemeClr>
-        </a:solidFill>
-        <a:ln w="9525" cap="rnd" cmpd="sng" algn="ctr">
-          <a:solidFill>
-            <a:schemeClr val="accent1">
-              <a:hueOff val="0"/>
-              <a:satOff val="0"/>
-              <a:lumOff val="0"/>
-              <a:alphaOff val="0"/>
-            </a:schemeClr>
-          </a:solidFill>
-          <a:prstDash val="solid"/>
-        </a:ln>
-        <a:effectLst/>
-      </dsp:spPr>
-      <dsp:style>
-        <a:lnRef idx="1">
-          <a:scrgbClr r="0" g="0" b="0"/>
-        </a:lnRef>
-        <a:fillRef idx="1">
-          <a:scrgbClr r="0" g="0" b="0"/>
-        </a:fillRef>
-        <a:effectRef idx="0">
-          <a:scrgbClr r="0" g="0" b="0"/>
-        </a:effectRef>
-        <a:fontRef idx="minor"/>
-      </dsp:style>
-      <dsp:txBody>
-        <a:bodyPr spcFirstLastPara="0" vert="horz" wrap="square" lIns="13335" tIns="8890" rIns="13335" bIns="8890" numCol="1" spcCol="1270" anchor="ctr" anchorCtr="0">
-          <a:noAutofit/>
-        </a:bodyPr>
-        <a:lstStyle/>
-        <a:p>
-          <a:pPr lvl="0" algn="ctr" defTabSz="311150">
-            <a:lnSpc>
-              <a:spcPct val="90000"/>
-            </a:lnSpc>
-            <a:spcBef>
-              <a:spcPct val="0"/>
-            </a:spcBef>
-            <a:spcAft>
-              <a:spcPct val="35000"/>
-            </a:spcAft>
-          </a:pPr>
-          <a:r>
-            <a:rPr lang="pt-PT" sz="700" kern="1200" dirty="0" smtClean="0"/>
-            <a:t>Too </a:t>
-          </a:r>
-          <a:r>
-            <a:rPr lang="pt-PT" sz="700" kern="1200" dirty="0" err="1" smtClean="0"/>
-            <a:t>simplistic</a:t>
-          </a:r>
-          <a:r>
-            <a:rPr lang="pt-PT" sz="700" kern="1200" dirty="0" smtClean="0"/>
-            <a:t> a </a:t>
-          </a:r>
-          <a:r>
-            <a:rPr lang="pt-PT" sz="700" kern="1200" dirty="0" err="1" smtClean="0"/>
-            <a:t>presentation</a:t>
-          </a:r>
-          <a:endParaRPr lang="pt-PT" sz="700" kern="1200" dirty="0"/>
-        </a:p>
-      </dsp:txBody>
-      <dsp:txXfrm>
-        <a:off x="3152695" y="613080"/>
-        <a:ext cx="703274" cy="429524"/>
-      </dsp:txXfrm>
-    </dsp:sp>
-    <dsp:sp modelId="{0B3358E2-26D5-461E-AD31-7A4654034337}">
-      <dsp:nvSpPr>
-        <dsp:cNvPr id="0" name=""/>
-        <dsp:cNvSpPr/>
-      </dsp:nvSpPr>
-      <dsp:spPr>
-        <a:xfrm>
-          <a:off x="3038957" y="505451"/>
-          <a:ext cx="100375" cy="872908"/>
-        </a:xfrm>
-        <a:custGeom>
-          <a:avLst/>
-          <a:gdLst/>
-          <a:ahLst/>
-          <a:cxnLst/>
-          <a:rect l="0" t="0" r="0" b="0"/>
-          <a:pathLst>
-            <a:path>
-              <a:moveTo>
-                <a:pt x="0" y="0"/>
-              </a:moveTo>
-              <a:lnTo>
-                <a:pt x="0" y="872908"/>
-              </a:lnTo>
-              <a:lnTo>
-                <a:pt x="100375" y="872908"/>
-              </a:lnTo>
-            </a:path>
-          </a:pathLst>
-        </a:custGeom>
-        <a:noFill/>
-        <a:ln w="9525" cap="rnd" cmpd="sng" algn="ctr">
-          <a:solidFill>
-            <a:schemeClr val="accent1">
-              <a:shade val="60000"/>
-              <a:hueOff val="0"/>
-              <a:satOff val="0"/>
-              <a:lumOff val="0"/>
-              <a:alphaOff val="0"/>
-            </a:schemeClr>
-          </a:solidFill>
-          <a:prstDash val="solid"/>
-        </a:ln>
-        <a:effectLst/>
-      </dsp:spPr>
-      <dsp:style>
-        <a:lnRef idx="1">
-          <a:scrgbClr r="0" g="0" b="0"/>
-        </a:lnRef>
-        <a:fillRef idx="0">
-          <a:scrgbClr r="0" g="0" b="0"/>
-        </a:fillRef>
-        <a:effectRef idx="0">
-          <a:scrgbClr r="0" g="0" b="0"/>
-        </a:effectRef>
-        <a:fontRef idx="minor"/>
-      </dsp:style>
-    </dsp:sp>
-    <dsp:sp modelId="{0E7FBF3B-7D1F-4A68-8FFB-C953C781DE15}">
-      <dsp:nvSpPr>
-        <dsp:cNvPr id="0" name=""/>
-        <dsp:cNvSpPr/>
-      </dsp:nvSpPr>
-      <dsp:spPr>
-        <a:xfrm>
-          <a:off x="3139332" y="1150234"/>
-          <a:ext cx="730000" cy="456250"/>
-        </a:xfrm>
-        <a:prstGeom prst="roundRect">
-          <a:avLst>
-            <a:gd name="adj" fmla="val 10000"/>
-          </a:avLst>
-        </a:prstGeom>
-        <a:solidFill>
-          <a:schemeClr val="lt1">
-            <a:alpha val="90000"/>
-            <a:hueOff val="0"/>
-            <a:satOff val="0"/>
-            <a:lumOff val="0"/>
-            <a:alphaOff val="0"/>
-          </a:schemeClr>
-        </a:solidFill>
-        <a:ln w="9525" cap="rnd" cmpd="sng" algn="ctr">
-          <a:solidFill>
-            <a:schemeClr val="accent1">
-              <a:hueOff val="0"/>
-              <a:satOff val="0"/>
-              <a:lumOff val="0"/>
-              <a:alphaOff val="0"/>
-            </a:schemeClr>
-          </a:solidFill>
-          <a:prstDash val="solid"/>
-        </a:ln>
-        <a:effectLst/>
-      </dsp:spPr>
-      <dsp:style>
-        <a:lnRef idx="1">
-          <a:scrgbClr r="0" g="0" b="0"/>
-        </a:lnRef>
-        <a:fillRef idx="1">
-          <a:scrgbClr r="0" g="0" b="0"/>
-        </a:fillRef>
-        <a:effectRef idx="0">
-          <a:scrgbClr r="0" g="0" b="0"/>
-        </a:effectRef>
-        <a:fontRef idx="minor"/>
-      </dsp:style>
-      <dsp:txBody>
-        <a:bodyPr spcFirstLastPara="0" vert="horz" wrap="square" lIns="13335" tIns="8890" rIns="13335" bIns="8890" numCol="1" spcCol="1270" anchor="ctr" anchorCtr="0">
-          <a:noAutofit/>
-        </a:bodyPr>
-        <a:lstStyle/>
-        <a:p>
-          <a:pPr lvl="0" algn="ctr" defTabSz="311150">
-            <a:lnSpc>
-              <a:spcPct val="90000"/>
-            </a:lnSpc>
-            <a:spcBef>
-              <a:spcPct val="0"/>
-            </a:spcBef>
-            <a:spcAft>
-              <a:spcPct val="35000"/>
-            </a:spcAft>
-          </a:pPr>
-          <a:r>
-            <a:rPr lang="pt-PT" sz="700" kern="1200" dirty="0" smtClean="0"/>
-            <a:t>Icons not very clear</a:t>
-          </a:r>
-          <a:endParaRPr lang="pt-PT" sz="700" kern="1200" dirty="0"/>
-        </a:p>
-      </dsp:txBody>
-      <dsp:txXfrm>
-        <a:off x="3152695" y="1163597"/>
-        <a:ext cx="703274" cy="429524"/>
-      </dsp:txXfrm>
-    </dsp:sp>
-    <dsp:sp modelId="{2F157E92-6736-4A13-A6CB-BE96A53AFD9F}">
-      <dsp:nvSpPr>
-        <dsp:cNvPr id="0" name=""/>
-        <dsp:cNvSpPr/>
-      </dsp:nvSpPr>
-      <dsp:spPr>
-        <a:xfrm>
-          <a:off x="3038957" y="505451"/>
-          <a:ext cx="100375" cy="1423425"/>
-        </a:xfrm>
-        <a:custGeom>
-          <a:avLst/>
-          <a:gdLst/>
-          <a:ahLst/>
-          <a:cxnLst/>
-          <a:rect l="0" t="0" r="0" b="0"/>
-          <a:pathLst>
-            <a:path>
-              <a:moveTo>
-                <a:pt x="0" y="0"/>
-              </a:moveTo>
-              <a:lnTo>
-                <a:pt x="0" y="1423425"/>
-              </a:lnTo>
-              <a:lnTo>
-                <a:pt x="100375" y="1423425"/>
-              </a:lnTo>
-            </a:path>
-          </a:pathLst>
-        </a:custGeom>
-        <a:noFill/>
-        <a:ln w="9525" cap="rnd" cmpd="sng" algn="ctr">
-          <a:solidFill>
-            <a:schemeClr val="accent1">
-              <a:shade val="60000"/>
-              <a:hueOff val="0"/>
-              <a:satOff val="0"/>
-              <a:lumOff val="0"/>
-              <a:alphaOff val="0"/>
-            </a:schemeClr>
-          </a:solidFill>
-          <a:prstDash val="solid"/>
-        </a:ln>
-        <a:effectLst/>
-      </dsp:spPr>
-      <dsp:style>
-        <a:lnRef idx="1">
-          <a:scrgbClr r="0" g="0" b="0"/>
-        </a:lnRef>
-        <a:fillRef idx="0">
-          <a:scrgbClr r="0" g="0" b="0"/>
-        </a:fillRef>
-        <a:effectRef idx="0">
-          <a:scrgbClr r="0" g="0" b="0"/>
-        </a:effectRef>
-        <a:fontRef idx="minor"/>
-      </dsp:style>
-    </dsp:sp>
-    <dsp:sp modelId="{548B7762-B5B8-4C69-88AE-F72473B32CBC}">
-      <dsp:nvSpPr>
-        <dsp:cNvPr id="0" name=""/>
-        <dsp:cNvSpPr/>
-      </dsp:nvSpPr>
-      <dsp:spPr>
-        <a:xfrm>
-          <a:off x="3139332" y="1700751"/>
-          <a:ext cx="730000" cy="456250"/>
-        </a:xfrm>
-        <a:prstGeom prst="roundRect">
-          <a:avLst>
-            <a:gd name="adj" fmla="val 10000"/>
-          </a:avLst>
-        </a:prstGeom>
-        <a:solidFill>
-          <a:schemeClr val="lt1">
-            <a:alpha val="90000"/>
-            <a:hueOff val="0"/>
-            <a:satOff val="0"/>
-            <a:lumOff val="0"/>
-            <a:alphaOff val="0"/>
-          </a:schemeClr>
-        </a:solidFill>
-        <a:ln w="9525" cap="rnd" cmpd="sng" algn="ctr">
-          <a:solidFill>
-            <a:schemeClr val="accent1">
-              <a:hueOff val="0"/>
-              <a:satOff val="0"/>
-              <a:lumOff val="0"/>
-              <a:alphaOff val="0"/>
-            </a:schemeClr>
-          </a:solidFill>
-          <a:prstDash val="solid"/>
-        </a:ln>
-        <a:effectLst/>
-      </dsp:spPr>
-      <dsp:style>
-        <a:lnRef idx="1">
-          <a:scrgbClr r="0" g="0" b="0"/>
-        </a:lnRef>
-        <a:fillRef idx="1">
-          <a:scrgbClr r="0" g="0" b="0"/>
-        </a:fillRef>
-        <a:effectRef idx="0">
-          <a:scrgbClr r="0" g="0" b="0"/>
-        </a:effectRef>
-        <a:fontRef idx="minor"/>
-      </dsp:style>
-      <dsp:txBody>
-        <a:bodyPr spcFirstLastPara="0" vert="horz" wrap="square" lIns="13335" tIns="8890" rIns="13335" bIns="8890" numCol="1" spcCol="1270" anchor="ctr" anchorCtr="0">
-          <a:noAutofit/>
-        </a:bodyPr>
-        <a:lstStyle/>
-        <a:p>
-          <a:pPr lvl="0" algn="ctr" defTabSz="311150">
-            <a:lnSpc>
-              <a:spcPct val="90000"/>
-            </a:lnSpc>
-            <a:spcBef>
-              <a:spcPct val="0"/>
-            </a:spcBef>
-            <a:spcAft>
-              <a:spcPct val="35000"/>
-            </a:spcAft>
-          </a:pPr>
-          <a:r>
-            <a:rPr lang="pt-PT" sz="700" kern="1200" dirty="0" smtClean="0"/>
-            <a:t>Some plugins require complicated configurations</a:t>
-          </a:r>
-          <a:endParaRPr lang="pt-PT" sz="700" kern="1200" dirty="0"/>
-        </a:p>
-      </dsp:txBody>
-      <dsp:txXfrm>
-        <a:off x="3152695" y="1714114"/>
-        <a:ext cx="703274" cy="429524"/>
-      </dsp:txXfrm>
-    </dsp:sp>
-    <dsp:sp modelId="{D69BB881-E2F5-44B9-9DBD-6D90C7DB7496}">
-      <dsp:nvSpPr>
-        <dsp:cNvPr id="0" name=""/>
-        <dsp:cNvSpPr/>
-      </dsp:nvSpPr>
-      <dsp:spPr>
-        <a:xfrm>
-          <a:off x="3038957" y="505451"/>
-          <a:ext cx="100375" cy="1973942"/>
-        </a:xfrm>
-        <a:custGeom>
-          <a:avLst/>
-          <a:gdLst/>
-          <a:ahLst/>
-          <a:cxnLst/>
-          <a:rect l="0" t="0" r="0" b="0"/>
-          <a:pathLst>
-            <a:path>
-              <a:moveTo>
-                <a:pt x="0" y="0"/>
-              </a:moveTo>
-              <a:lnTo>
-                <a:pt x="0" y="1973942"/>
-              </a:lnTo>
-              <a:lnTo>
-                <a:pt x="100375" y="1973942"/>
-              </a:lnTo>
-            </a:path>
-          </a:pathLst>
-        </a:custGeom>
-        <a:noFill/>
-        <a:ln w="9525" cap="rnd" cmpd="sng" algn="ctr">
-          <a:solidFill>
-            <a:schemeClr val="accent1">
-              <a:shade val="60000"/>
-              <a:hueOff val="0"/>
-              <a:satOff val="0"/>
-              <a:lumOff val="0"/>
-              <a:alphaOff val="0"/>
-            </a:schemeClr>
-          </a:solidFill>
-          <a:prstDash val="solid"/>
-        </a:ln>
-        <a:effectLst/>
-      </dsp:spPr>
-      <dsp:style>
-        <a:lnRef idx="1">
-          <a:scrgbClr r="0" g="0" b="0"/>
-        </a:lnRef>
-        <a:fillRef idx="0">
-          <a:scrgbClr r="0" g="0" b="0"/>
-        </a:fillRef>
-        <a:effectRef idx="0">
-          <a:scrgbClr r="0" g="0" b="0"/>
-        </a:effectRef>
-        <a:fontRef idx="minor"/>
-      </dsp:style>
-    </dsp:sp>
-    <dsp:sp modelId="{50E43E93-9EF6-4576-8695-D64977549991}">
-      <dsp:nvSpPr>
-        <dsp:cNvPr id="0" name=""/>
-        <dsp:cNvSpPr/>
-      </dsp:nvSpPr>
-      <dsp:spPr>
-        <a:xfrm>
-          <a:off x="3139332" y="2251268"/>
-          <a:ext cx="730000" cy="456250"/>
-        </a:xfrm>
-        <a:prstGeom prst="roundRect">
-          <a:avLst>
-            <a:gd name="adj" fmla="val 10000"/>
-          </a:avLst>
-        </a:prstGeom>
-        <a:solidFill>
-          <a:schemeClr val="lt1">
-            <a:alpha val="90000"/>
-            <a:hueOff val="0"/>
-            <a:satOff val="0"/>
-            <a:lumOff val="0"/>
-            <a:alphaOff val="0"/>
-          </a:schemeClr>
-        </a:solidFill>
-        <a:ln w="9525" cap="rnd" cmpd="sng" algn="ctr">
-          <a:solidFill>
-            <a:schemeClr val="accent1">
-              <a:hueOff val="0"/>
-              <a:satOff val="0"/>
-              <a:lumOff val="0"/>
-              <a:alphaOff val="0"/>
-            </a:schemeClr>
-          </a:solidFill>
-          <a:prstDash val="solid"/>
-        </a:ln>
-        <a:effectLst/>
-      </dsp:spPr>
-      <dsp:style>
-        <a:lnRef idx="1">
-          <a:scrgbClr r="0" g="0" b="0"/>
-        </a:lnRef>
-        <a:fillRef idx="1">
-          <a:scrgbClr r="0" g="0" b="0"/>
-        </a:fillRef>
-        <a:effectRef idx="0">
-          <a:scrgbClr r="0" g="0" b="0"/>
-        </a:effectRef>
-        <a:fontRef idx="minor"/>
-      </dsp:style>
-      <dsp:txBody>
-        <a:bodyPr spcFirstLastPara="0" vert="horz" wrap="square" lIns="13335" tIns="8890" rIns="13335" bIns="8890" numCol="1" spcCol="1270" anchor="ctr" anchorCtr="0">
-          <a:noAutofit/>
-        </a:bodyPr>
-        <a:lstStyle/>
-        <a:p>
-          <a:pPr lvl="0" algn="ctr" defTabSz="311150">
-            <a:lnSpc>
-              <a:spcPct val="90000"/>
-            </a:lnSpc>
-            <a:spcBef>
-              <a:spcPct val="0"/>
-            </a:spcBef>
-            <a:spcAft>
-              <a:spcPct val="35000"/>
-            </a:spcAft>
-          </a:pPr>
-          <a:r>
-            <a:rPr lang="pt-PT" sz="700" kern="1200" dirty="0" smtClean="0"/>
-            <a:t>Constant effort for maintaince</a:t>
-          </a:r>
-          <a:endParaRPr lang="pt-PT" sz="700" kern="1200" dirty="0"/>
-        </a:p>
-      </dsp:txBody>
-      <dsp:txXfrm>
-        <a:off x="3152695" y="2264631"/>
-        <a:ext cx="703274" cy="429524"/>
-      </dsp:txXfrm>
-    </dsp:sp>
-    <dsp:sp modelId="{4F01DEA1-6963-411C-B81A-F6998C0C045E}">
-      <dsp:nvSpPr>
-        <dsp:cNvPr id="0" name=""/>
-        <dsp:cNvSpPr/>
-      </dsp:nvSpPr>
-      <dsp:spPr>
-        <a:xfrm>
-          <a:off x="3038957" y="505451"/>
-          <a:ext cx="100375" cy="2524458"/>
-        </a:xfrm>
-        <a:custGeom>
-          <a:avLst/>
-          <a:gdLst/>
-          <a:ahLst/>
-          <a:cxnLst/>
-          <a:rect l="0" t="0" r="0" b="0"/>
-          <a:pathLst>
-            <a:path>
-              <a:moveTo>
-                <a:pt x="0" y="0"/>
-              </a:moveTo>
-              <a:lnTo>
-                <a:pt x="0" y="2524458"/>
-              </a:lnTo>
-              <a:lnTo>
-                <a:pt x="100375" y="2524458"/>
-              </a:lnTo>
-            </a:path>
-          </a:pathLst>
-        </a:custGeom>
-        <a:noFill/>
-        <a:ln w="9525" cap="rnd" cmpd="sng" algn="ctr">
-          <a:solidFill>
-            <a:schemeClr val="accent1">
-              <a:shade val="60000"/>
-              <a:hueOff val="0"/>
-              <a:satOff val="0"/>
-              <a:lumOff val="0"/>
-              <a:alphaOff val="0"/>
-            </a:schemeClr>
-          </a:solidFill>
-          <a:prstDash val="solid"/>
-        </a:ln>
-        <a:effectLst/>
-      </dsp:spPr>
-      <dsp:style>
-        <a:lnRef idx="1">
-          <a:scrgbClr r="0" g="0" b="0"/>
-        </a:lnRef>
-        <a:fillRef idx="0">
-          <a:scrgbClr r="0" g="0" b="0"/>
-        </a:fillRef>
-        <a:effectRef idx="0">
-          <a:scrgbClr r="0" g="0" b="0"/>
-        </a:effectRef>
-        <a:fontRef idx="minor"/>
-      </dsp:style>
-    </dsp:sp>
-    <dsp:sp modelId="{5F110DA3-1DE8-4F12-A68F-86C4A5BF1E8C}">
-      <dsp:nvSpPr>
-        <dsp:cNvPr id="0" name=""/>
-        <dsp:cNvSpPr/>
-      </dsp:nvSpPr>
-      <dsp:spPr>
-        <a:xfrm>
-          <a:off x="3139332" y="2801785"/>
-          <a:ext cx="730000" cy="456250"/>
-        </a:xfrm>
-        <a:prstGeom prst="roundRect">
-          <a:avLst>
-            <a:gd name="adj" fmla="val 10000"/>
-          </a:avLst>
-        </a:prstGeom>
-        <a:solidFill>
-          <a:schemeClr val="lt1">
-            <a:alpha val="90000"/>
-            <a:hueOff val="0"/>
-            <a:satOff val="0"/>
-            <a:lumOff val="0"/>
-            <a:alphaOff val="0"/>
-          </a:schemeClr>
-        </a:solidFill>
-        <a:ln w="9525" cap="rnd" cmpd="sng" algn="ctr">
-          <a:solidFill>
-            <a:schemeClr val="accent1">
-              <a:hueOff val="0"/>
-              <a:satOff val="0"/>
-              <a:lumOff val="0"/>
-              <a:alphaOff val="0"/>
-            </a:schemeClr>
-          </a:solidFill>
-          <a:prstDash val="solid"/>
-        </a:ln>
-        <a:effectLst/>
-      </dsp:spPr>
-      <dsp:style>
-        <a:lnRef idx="1">
-          <a:scrgbClr r="0" g="0" b="0"/>
-        </a:lnRef>
-        <a:fillRef idx="1">
-          <a:scrgbClr r="0" g="0" b="0"/>
-        </a:fillRef>
-        <a:effectRef idx="0">
-          <a:scrgbClr r="0" g="0" b="0"/>
-        </a:effectRef>
-        <a:fontRef idx="minor"/>
-      </dsp:style>
-      <dsp:txBody>
-        <a:bodyPr spcFirstLastPara="0" vert="horz" wrap="square" lIns="13335" tIns="8890" rIns="13335" bIns="8890" numCol="1" spcCol="1270" anchor="ctr" anchorCtr="0">
-          <a:noAutofit/>
-        </a:bodyPr>
-        <a:lstStyle/>
-        <a:p>
-          <a:pPr lvl="0" algn="ctr" defTabSz="311150">
-            <a:lnSpc>
-              <a:spcPct val="90000"/>
-            </a:lnSpc>
-            <a:spcBef>
-              <a:spcPct val="0"/>
-            </a:spcBef>
-            <a:spcAft>
-              <a:spcPct val="35000"/>
-            </a:spcAft>
-          </a:pPr>
-          <a:r>
-            <a:rPr lang="pt-PT" sz="700" kern="1200" dirty="0" smtClean="0"/>
-            <a:t>Can be “overwhelming”</a:t>
-          </a:r>
-          <a:endParaRPr lang="pt-PT" sz="700" kern="1200" dirty="0"/>
-        </a:p>
-      </dsp:txBody>
-      <dsp:txXfrm>
-        <a:off x="3152695" y="2815148"/>
-        <a:ext cx="703274" cy="429524"/>
-      </dsp:txXfrm>
-    </dsp:sp>
-    <dsp:sp modelId="{42A4DB9D-6604-49D8-A581-EB7995E16BE9}">
-      <dsp:nvSpPr>
-        <dsp:cNvPr id="0" name=""/>
-        <dsp:cNvSpPr/>
-      </dsp:nvSpPr>
-      <dsp:spPr>
-        <a:xfrm>
-          <a:off x="3038957" y="505451"/>
-          <a:ext cx="100375" cy="3074975"/>
-        </a:xfrm>
-        <a:custGeom>
-          <a:avLst/>
-          <a:gdLst/>
-          <a:ahLst/>
-          <a:cxnLst/>
-          <a:rect l="0" t="0" r="0" b="0"/>
-          <a:pathLst>
-            <a:path>
-              <a:moveTo>
-                <a:pt x="0" y="0"/>
-              </a:moveTo>
-              <a:lnTo>
-                <a:pt x="0" y="3074975"/>
-              </a:lnTo>
-              <a:lnTo>
-                <a:pt x="100375" y="3074975"/>
-              </a:lnTo>
-            </a:path>
-          </a:pathLst>
-        </a:custGeom>
-        <a:noFill/>
-        <a:ln w="9525" cap="rnd" cmpd="sng" algn="ctr">
-          <a:solidFill>
-            <a:schemeClr val="accent1">
-              <a:shade val="60000"/>
-              <a:hueOff val="0"/>
-              <a:satOff val="0"/>
-              <a:lumOff val="0"/>
-              <a:alphaOff val="0"/>
-            </a:schemeClr>
-          </a:solidFill>
-          <a:prstDash val="solid"/>
-        </a:ln>
-        <a:effectLst/>
-      </dsp:spPr>
-      <dsp:style>
-        <a:lnRef idx="1">
-          <a:scrgbClr r="0" g="0" b="0"/>
-        </a:lnRef>
-        <a:fillRef idx="0">
-          <a:scrgbClr r="0" g="0" b="0"/>
-        </a:fillRef>
-        <a:effectRef idx="0">
-          <a:scrgbClr r="0" g="0" b="0"/>
-        </a:effectRef>
-        <a:fontRef idx="minor"/>
-      </dsp:style>
-    </dsp:sp>
-    <dsp:sp modelId="{7FB5A010-9A56-4829-B858-D0D824AEF6AD}">
-      <dsp:nvSpPr>
-        <dsp:cNvPr id="0" name=""/>
-        <dsp:cNvSpPr/>
-      </dsp:nvSpPr>
-      <dsp:spPr>
-        <a:xfrm>
-          <a:off x="3139332" y="3352301"/>
-          <a:ext cx="730000" cy="456250"/>
-        </a:xfrm>
-        <a:prstGeom prst="roundRect">
-          <a:avLst>
-            <a:gd name="adj" fmla="val 10000"/>
-          </a:avLst>
-        </a:prstGeom>
-        <a:solidFill>
-          <a:schemeClr val="lt1">
-            <a:alpha val="90000"/>
-            <a:hueOff val="0"/>
-            <a:satOff val="0"/>
-            <a:lumOff val="0"/>
-            <a:alphaOff val="0"/>
-          </a:schemeClr>
-        </a:solidFill>
-        <a:ln w="9525" cap="rnd" cmpd="sng" algn="ctr">
-          <a:solidFill>
-            <a:schemeClr val="accent1">
-              <a:hueOff val="0"/>
-              <a:satOff val="0"/>
-              <a:lumOff val="0"/>
-              <a:alphaOff val="0"/>
-            </a:schemeClr>
-          </a:solidFill>
-          <a:prstDash val="solid"/>
-        </a:ln>
-        <a:effectLst/>
-      </dsp:spPr>
-      <dsp:style>
-        <a:lnRef idx="1">
-          <a:scrgbClr r="0" g="0" b="0"/>
-        </a:lnRef>
-        <a:fillRef idx="1">
-          <a:scrgbClr r="0" g="0" b="0"/>
-        </a:fillRef>
-        <a:effectRef idx="0">
-          <a:scrgbClr r="0" g="0" b="0"/>
-        </a:effectRef>
-        <a:fontRef idx="minor"/>
-      </dsp:style>
-      <dsp:txBody>
-        <a:bodyPr spcFirstLastPara="0" vert="horz" wrap="square" lIns="13335" tIns="8890" rIns="13335" bIns="8890" numCol="1" spcCol="1270" anchor="ctr" anchorCtr="0">
-          <a:noAutofit/>
-        </a:bodyPr>
-        <a:lstStyle/>
-        <a:p>
-          <a:pPr lvl="0" algn="ctr" defTabSz="311150">
-            <a:lnSpc>
-              <a:spcPct val="90000"/>
-            </a:lnSpc>
-            <a:spcBef>
-              <a:spcPct val="0"/>
-            </a:spcBef>
-            <a:spcAft>
-              <a:spcPct val="35000"/>
-            </a:spcAft>
-          </a:pPr>
-          <a:r>
-            <a:rPr lang="pt-PT" sz="700" kern="1200" dirty="0" smtClean="0"/>
-            <a:t>Setup time</a:t>
-          </a:r>
-          <a:endParaRPr lang="pt-PT" sz="700" kern="1200" dirty="0"/>
-        </a:p>
-      </dsp:txBody>
-      <dsp:txXfrm>
-        <a:off x="3152695" y="3365664"/>
-        <a:ext cx="703274" cy="429524"/>
-      </dsp:txXfrm>
-    </dsp:sp>
   </dsp:spTree>
 </dsp:drawing>
 </file>
@@ -5429,7 +3449,7 @@
           <a:p>
             <a:fld id="{20EA5F0D-C1DC-412F-A146-DDB3A74B588F}" type="datetimeFigureOut">
               <a:rPr lang="en-US"/>
-              <a:t>10/5/2016</a:t>
+              <a:t>10/6/2016</a:t>
             </a:fld>
             <a:endParaRPr/>
           </a:p>
@@ -5594,7 +3614,7 @@
           <a:p>
             <a:fld id="{A8CDE508-72C8-4AB5-AA9C-1584D31690E0}" type="datetimeFigureOut">
               <a:rPr lang="en-US"/>
-              <a:t>10/5/2016</a:t>
+              <a:t>10/6/2016</a:t>
             </a:fld>
             <a:endParaRPr/>
           </a:p>
@@ -21840,7 +19860,7 @@
   </p:txStyles>
   <p:extLst>
     <p:ext uri="{27BBF7A9-308A-43DC-89C8-2F10F3537804}">
-      <p15:sldGuideLst xmlns:p15="http://schemas.microsoft.com/office/powerpoint/2012/main" xmlns=""/>
+      <p15:sldGuideLst xmlns:p15="http://schemas.microsoft.com/office/powerpoint/2012/main"/>
     </p:ext>
   </p:extLst>
 </p:sldMaster>
@@ -24578,11 +22598,7 @@
             </a:r>
             <a:r>
               <a:rPr lang="pt-PT" dirty="0" err="1" smtClean="0"/>
-              <a:t>Test</a:t>
-            </a:r>
-            <a:r>
-              <a:rPr lang="pt-PT" dirty="0" err="1" smtClean="0"/>
-              <a:t>s</a:t>
+              <a:t>Tests</a:t>
             </a:r>
             <a:r>
               <a:rPr lang="pt-PT" dirty="0" smtClean="0"/>
@@ -27451,7 +25467,7 @@
           <p:nvPr>
             <p:extLst>
               <p:ext uri="{D42A27DB-BD31-4B8C-83A1-F6EECF244321}">
-                <p14:modId xmlns:p14="http://schemas.microsoft.com/office/powerpoint/2010/main" val="2756542596"/>
+                <p14:modId xmlns:p14="http://schemas.microsoft.com/office/powerpoint/2010/main" val="701813598"/>
               </p:ext>
             </p:extLst>
           </p:nvPr>
@@ -27703,6 +25719,18 @@
                     <a:lstStyle/>
                     <a:p>
                       <a:pPr algn="ctr"/>
+                      <a:r>
+                        <a:rPr lang="pt-PT" dirty="0" smtClean="0"/>
+                        <a:t>Eclipse,</a:t>
+                      </a:r>
+                      <a:r>
+                        <a:rPr lang="pt-PT" baseline="0" dirty="0" smtClean="0"/>
+                        <a:t> </a:t>
+                      </a:r>
+                      <a:r>
+                        <a:rPr lang="pt-PT" baseline="0" dirty="0" err="1" smtClean="0"/>
+                        <a:t>IntelliJ</a:t>
+                      </a:r>
                       <a:endParaRPr lang="pt-PT" dirty="0"/>
                     </a:p>
                   </a:txBody>
@@ -27783,6 +25811,10 @@
                     <a:lstStyle/>
                     <a:p>
                       <a:pPr algn="ctr"/>
+                      <a:r>
+                        <a:rPr lang="pt-PT" dirty="0" err="1" smtClean="0"/>
+                        <a:t>Git,SVN,Mercurial</a:t>
+                      </a:r>
                       <a:endParaRPr lang="pt-PT" dirty="0"/>
                     </a:p>
                   </a:txBody>
@@ -27863,6 +25895,10 @@
                     <a:lstStyle/>
                     <a:p>
                       <a:pPr algn="ctr"/>
+                      <a:r>
+                        <a:rPr lang="pt-PT" smtClean="0"/>
+                        <a:t>Web server</a:t>
+                      </a:r>
                       <a:endParaRPr lang="pt-PT" dirty="0"/>
                     </a:p>
                   </a:txBody>
@@ -27935,6 +25971,10 @@
                     <a:lstStyle/>
                     <a:p>
                       <a:pPr algn="ctr"/>
+                      <a:r>
+                        <a:rPr lang="pt-PT" dirty="0" smtClean="0"/>
+                        <a:t>NO</a:t>
+                      </a:r>
                       <a:endParaRPr lang="pt-PT" dirty="0"/>
                     </a:p>
                   </a:txBody>
@@ -28035,6 +26075,10 @@
                     <a:lstStyle/>
                     <a:p>
                       <a:pPr algn="ctr"/>
+                      <a:r>
+                        <a:rPr lang="pt-PT" dirty="0" err="1" smtClean="0"/>
+                        <a:t>Good</a:t>
+                      </a:r>
                       <a:endParaRPr lang="pt-PT" dirty="0"/>
                     </a:p>
                   </a:txBody>
@@ -30983,7 +29027,7 @@
   <a:extraClrSchemeLst/>
   <a:extLst>
     <a:ext uri="{05A4C25C-085E-4340-85A3-A5531E510DB2}">
-      <thm15:themeFamily xmlns:thm15="http://schemas.microsoft.com/office/thememl/2012/main" xmlns="" name="Ion Boardroom" id="{FC33163D-4339-46B1-8EED-24C834239D99}" vid="{BF1C4790-FE3C-4020-8CA7-00621DA7BBBC}"/>
+      <thm15:themeFamily xmlns:thm15="http://schemas.microsoft.com/office/thememl/2012/main" name="Ion Boardroom" id="{FC33163D-4339-46B1-8EED-24C834239D99}" vid="{BF1C4790-FE3C-4020-8CA7-00621DA7BBBC}"/>
     </a:ext>
   </a:extLst>
 </a:theme>

</xml_diff>